<commit_message>
Updated Readme to include information on the processing pipeline.
</commit_message>
<xml_diff>
--- a/Traceability/Images/GraphicSource.pptx
+++ b/Traceability/Images/GraphicSource.pptx
@@ -8,6 +8,7 @@
     <p:sldId id="256" r:id="rId2"/>
     <p:sldId id="257" r:id="rId3"/>
     <p:sldId id="258" r:id="rId4"/>
+    <p:sldId id="259" r:id="rId5"/>
   </p:sldIdLst>
   <p:sldSz cx="12192000" cy="6858000"/>
   <p:notesSz cx="6858000" cy="9144000"/>
@@ -126,6 +127,753 @@
 </file>
 
 <file path=ppt/diagrams/colors1.xml><?xml version="1.0" encoding="utf-8"?>
+<dgm:colorsDef xmlns:dgm="http://schemas.openxmlformats.org/drawingml/2006/diagram" xmlns:a="http://schemas.openxmlformats.org/drawingml/2006/main" uniqueId="urn:microsoft.com/office/officeart/2005/8/colors/accent1_2">
+  <dgm:title val=""/>
+  <dgm:desc val=""/>
+  <dgm:catLst>
+    <dgm:cat type="accent1" pri="11200"/>
+  </dgm:catLst>
+  <dgm:styleLbl name="node0">
+    <dgm:fillClrLst meth="repeat">
+      <a:schemeClr val="accent1"/>
+    </dgm:fillClrLst>
+    <dgm:linClrLst meth="repeat">
+      <a:schemeClr val="lt1"/>
+    </dgm:linClrLst>
+    <dgm:effectClrLst/>
+    <dgm:txLinClrLst/>
+    <dgm:txFillClrLst/>
+    <dgm:txEffectClrLst/>
+  </dgm:styleLbl>
+  <dgm:styleLbl name="alignNode1">
+    <dgm:fillClrLst meth="repeat">
+      <a:schemeClr val="accent1"/>
+    </dgm:fillClrLst>
+    <dgm:linClrLst meth="repeat">
+      <a:schemeClr val="accent1"/>
+    </dgm:linClrLst>
+    <dgm:effectClrLst/>
+    <dgm:txLinClrLst/>
+    <dgm:txFillClrLst/>
+    <dgm:txEffectClrLst/>
+  </dgm:styleLbl>
+  <dgm:styleLbl name="node1">
+    <dgm:fillClrLst meth="repeat">
+      <a:schemeClr val="accent1"/>
+    </dgm:fillClrLst>
+    <dgm:linClrLst meth="repeat">
+      <a:schemeClr val="lt1"/>
+    </dgm:linClrLst>
+    <dgm:effectClrLst/>
+    <dgm:txLinClrLst/>
+    <dgm:txFillClrLst/>
+    <dgm:txEffectClrLst/>
+  </dgm:styleLbl>
+  <dgm:styleLbl name="lnNode1">
+    <dgm:fillClrLst meth="repeat">
+      <a:schemeClr val="accent1"/>
+    </dgm:fillClrLst>
+    <dgm:linClrLst meth="repeat">
+      <a:schemeClr val="lt1"/>
+    </dgm:linClrLst>
+    <dgm:effectClrLst/>
+    <dgm:txLinClrLst/>
+    <dgm:txFillClrLst/>
+    <dgm:txEffectClrLst/>
+  </dgm:styleLbl>
+  <dgm:styleLbl name="vennNode1">
+    <dgm:fillClrLst meth="repeat">
+      <a:schemeClr val="accent1">
+        <a:alpha val="50000"/>
+      </a:schemeClr>
+    </dgm:fillClrLst>
+    <dgm:linClrLst meth="repeat">
+      <a:schemeClr val="lt1"/>
+    </dgm:linClrLst>
+    <dgm:effectClrLst/>
+    <dgm:txLinClrLst/>
+    <dgm:txFillClrLst/>
+    <dgm:txEffectClrLst/>
+  </dgm:styleLbl>
+  <dgm:styleLbl name="node2">
+    <dgm:fillClrLst meth="repeat">
+      <a:schemeClr val="accent1"/>
+    </dgm:fillClrLst>
+    <dgm:linClrLst meth="repeat">
+      <a:schemeClr val="lt1"/>
+    </dgm:linClrLst>
+    <dgm:effectClrLst/>
+    <dgm:txLinClrLst/>
+    <dgm:txFillClrLst/>
+    <dgm:txEffectClrLst/>
+  </dgm:styleLbl>
+  <dgm:styleLbl name="node3">
+    <dgm:fillClrLst meth="repeat">
+      <a:schemeClr val="accent1"/>
+    </dgm:fillClrLst>
+    <dgm:linClrLst meth="repeat">
+      <a:schemeClr val="lt1"/>
+    </dgm:linClrLst>
+    <dgm:effectClrLst/>
+    <dgm:txLinClrLst/>
+    <dgm:txFillClrLst/>
+    <dgm:txEffectClrLst/>
+  </dgm:styleLbl>
+  <dgm:styleLbl name="node4">
+    <dgm:fillClrLst meth="repeat">
+      <a:schemeClr val="accent1"/>
+    </dgm:fillClrLst>
+    <dgm:linClrLst meth="repeat">
+      <a:schemeClr val="lt1"/>
+    </dgm:linClrLst>
+    <dgm:effectClrLst/>
+    <dgm:txLinClrLst/>
+    <dgm:txFillClrLst/>
+    <dgm:txEffectClrLst/>
+  </dgm:styleLbl>
+  <dgm:styleLbl name="fgImgPlace1">
+    <dgm:fillClrLst meth="repeat">
+      <a:schemeClr val="accent1">
+        <a:tint val="50000"/>
+      </a:schemeClr>
+    </dgm:fillClrLst>
+    <dgm:linClrLst meth="repeat">
+      <a:schemeClr val="lt1"/>
+    </dgm:linClrLst>
+    <dgm:effectClrLst/>
+    <dgm:txLinClrLst/>
+    <dgm:txFillClrLst meth="repeat">
+      <a:schemeClr val="lt1"/>
+    </dgm:txFillClrLst>
+    <dgm:txEffectClrLst/>
+  </dgm:styleLbl>
+  <dgm:styleLbl name="alignImgPlace1">
+    <dgm:fillClrLst meth="repeat">
+      <a:schemeClr val="accent1">
+        <a:tint val="50000"/>
+      </a:schemeClr>
+    </dgm:fillClrLst>
+    <dgm:linClrLst meth="repeat">
+      <a:schemeClr val="lt1"/>
+    </dgm:linClrLst>
+    <dgm:effectClrLst/>
+    <dgm:txLinClrLst/>
+    <dgm:txFillClrLst meth="repeat">
+      <a:schemeClr val="lt1"/>
+    </dgm:txFillClrLst>
+    <dgm:txEffectClrLst/>
+  </dgm:styleLbl>
+  <dgm:styleLbl name="bgImgPlace1">
+    <dgm:fillClrLst meth="repeat">
+      <a:schemeClr val="accent1">
+        <a:tint val="50000"/>
+      </a:schemeClr>
+    </dgm:fillClrLst>
+    <dgm:linClrLst meth="repeat">
+      <a:schemeClr val="lt1"/>
+    </dgm:linClrLst>
+    <dgm:effectClrLst/>
+    <dgm:txLinClrLst/>
+    <dgm:txFillClrLst meth="repeat">
+      <a:schemeClr val="lt1"/>
+    </dgm:txFillClrLst>
+    <dgm:txEffectClrLst/>
+  </dgm:styleLbl>
+  <dgm:styleLbl name="sibTrans2D1">
+    <dgm:fillClrLst meth="repeat">
+      <a:schemeClr val="accent1">
+        <a:tint val="60000"/>
+      </a:schemeClr>
+    </dgm:fillClrLst>
+    <dgm:linClrLst meth="repeat">
+      <a:schemeClr val="accent1">
+        <a:tint val="60000"/>
+      </a:schemeClr>
+    </dgm:linClrLst>
+    <dgm:effectClrLst/>
+    <dgm:txLinClrLst/>
+    <dgm:txFillClrLst/>
+    <dgm:txEffectClrLst/>
+  </dgm:styleLbl>
+  <dgm:styleLbl name="fgSibTrans2D1">
+    <dgm:fillClrLst meth="repeat">
+      <a:schemeClr val="accent1">
+        <a:tint val="60000"/>
+      </a:schemeClr>
+    </dgm:fillClrLst>
+    <dgm:linClrLst meth="repeat">
+      <a:schemeClr val="accent1">
+        <a:tint val="60000"/>
+      </a:schemeClr>
+    </dgm:linClrLst>
+    <dgm:effectClrLst/>
+    <dgm:txLinClrLst/>
+    <dgm:txFillClrLst/>
+    <dgm:txEffectClrLst/>
+  </dgm:styleLbl>
+  <dgm:styleLbl name="bgSibTrans2D1">
+    <dgm:fillClrLst meth="repeat">
+      <a:schemeClr val="accent1">
+        <a:tint val="60000"/>
+      </a:schemeClr>
+    </dgm:fillClrLst>
+    <dgm:linClrLst meth="repeat">
+      <a:schemeClr val="accent1">
+        <a:tint val="60000"/>
+      </a:schemeClr>
+    </dgm:linClrLst>
+    <dgm:effectClrLst/>
+    <dgm:txLinClrLst/>
+    <dgm:txFillClrLst/>
+    <dgm:txEffectClrLst/>
+  </dgm:styleLbl>
+  <dgm:styleLbl name="sibTrans1D1">
+    <dgm:fillClrLst meth="repeat">
+      <a:schemeClr val="accent1"/>
+    </dgm:fillClrLst>
+    <dgm:linClrLst meth="repeat">
+      <a:schemeClr val="accent1"/>
+    </dgm:linClrLst>
+    <dgm:effectClrLst/>
+    <dgm:txLinClrLst/>
+    <dgm:txFillClrLst meth="repeat">
+      <a:schemeClr val="tx1"/>
+    </dgm:txFillClrLst>
+    <dgm:txEffectClrLst/>
+  </dgm:styleLbl>
+  <dgm:styleLbl name="callout">
+    <dgm:fillClrLst meth="repeat">
+      <a:schemeClr val="accent1"/>
+    </dgm:fillClrLst>
+    <dgm:linClrLst meth="repeat">
+      <a:schemeClr val="accent1">
+        <a:tint val="50000"/>
+      </a:schemeClr>
+    </dgm:linClrLst>
+    <dgm:effectClrLst/>
+    <dgm:txLinClrLst/>
+    <dgm:txFillClrLst meth="repeat">
+      <a:schemeClr val="tx1"/>
+    </dgm:txFillClrLst>
+    <dgm:txEffectClrLst/>
+  </dgm:styleLbl>
+  <dgm:styleLbl name="asst0">
+    <dgm:fillClrLst meth="repeat">
+      <a:schemeClr val="accent1"/>
+    </dgm:fillClrLst>
+    <dgm:linClrLst meth="repeat">
+      <a:schemeClr val="lt1"/>
+    </dgm:linClrLst>
+    <dgm:effectClrLst/>
+    <dgm:txLinClrLst/>
+    <dgm:txFillClrLst/>
+    <dgm:txEffectClrLst/>
+  </dgm:styleLbl>
+  <dgm:styleLbl name="asst1">
+    <dgm:fillClrLst meth="repeat">
+      <a:schemeClr val="accent1"/>
+    </dgm:fillClrLst>
+    <dgm:linClrLst meth="repeat">
+      <a:schemeClr val="lt1"/>
+    </dgm:linClrLst>
+    <dgm:effectClrLst/>
+    <dgm:txLinClrLst/>
+    <dgm:txFillClrLst/>
+    <dgm:txEffectClrLst/>
+  </dgm:styleLbl>
+  <dgm:styleLbl name="asst2">
+    <dgm:fillClrLst meth="repeat">
+      <a:schemeClr val="accent1"/>
+    </dgm:fillClrLst>
+    <dgm:linClrLst meth="repeat">
+      <a:schemeClr val="lt1"/>
+    </dgm:linClrLst>
+    <dgm:effectClrLst/>
+    <dgm:txLinClrLst/>
+    <dgm:txFillClrLst/>
+    <dgm:txEffectClrLst/>
+  </dgm:styleLbl>
+  <dgm:styleLbl name="asst3">
+    <dgm:fillClrLst meth="repeat">
+      <a:schemeClr val="accent1"/>
+    </dgm:fillClrLst>
+    <dgm:linClrLst meth="repeat">
+      <a:schemeClr val="lt1"/>
+    </dgm:linClrLst>
+    <dgm:effectClrLst/>
+    <dgm:txLinClrLst/>
+    <dgm:txFillClrLst/>
+    <dgm:txEffectClrLst/>
+  </dgm:styleLbl>
+  <dgm:styleLbl name="asst4">
+    <dgm:fillClrLst meth="repeat">
+      <a:schemeClr val="accent1"/>
+    </dgm:fillClrLst>
+    <dgm:linClrLst meth="repeat">
+      <a:schemeClr val="lt1"/>
+    </dgm:linClrLst>
+    <dgm:effectClrLst/>
+    <dgm:txLinClrLst/>
+    <dgm:txFillClrLst/>
+    <dgm:txEffectClrLst/>
+  </dgm:styleLbl>
+  <dgm:styleLbl name="parChTrans2D1">
+    <dgm:fillClrLst meth="repeat">
+      <a:schemeClr val="accent1">
+        <a:tint val="60000"/>
+      </a:schemeClr>
+    </dgm:fillClrLst>
+    <dgm:linClrLst meth="repeat">
+      <a:schemeClr val="accent1">
+        <a:tint val="60000"/>
+      </a:schemeClr>
+    </dgm:linClrLst>
+    <dgm:effectClrLst/>
+    <dgm:txLinClrLst/>
+    <dgm:txFillClrLst meth="repeat">
+      <a:schemeClr val="lt1"/>
+    </dgm:txFillClrLst>
+    <dgm:txEffectClrLst/>
+  </dgm:styleLbl>
+  <dgm:styleLbl name="parChTrans2D2">
+    <dgm:fillClrLst meth="repeat">
+      <a:schemeClr val="accent1"/>
+    </dgm:fillClrLst>
+    <dgm:linClrLst meth="repeat">
+      <a:schemeClr val="accent1"/>
+    </dgm:linClrLst>
+    <dgm:effectClrLst/>
+    <dgm:txLinClrLst/>
+    <dgm:txFillClrLst meth="repeat">
+      <a:schemeClr val="lt1"/>
+    </dgm:txFillClrLst>
+    <dgm:txEffectClrLst/>
+  </dgm:styleLbl>
+  <dgm:styleLbl name="parChTrans2D3">
+    <dgm:fillClrLst meth="repeat">
+      <a:schemeClr val="accent1"/>
+    </dgm:fillClrLst>
+    <dgm:linClrLst meth="repeat">
+      <a:schemeClr val="accent1"/>
+    </dgm:linClrLst>
+    <dgm:effectClrLst/>
+    <dgm:txLinClrLst/>
+    <dgm:txFillClrLst meth="repeat">
+      <a:schemeClr val="lt1"/>
+    </dgm:txFillClrLst>
+    <dgm:txEffectClrLst/>
+  </dgm:styleLbl>
+  <dgm:styleLbl name="parChTrans2D4">
+    <dgm:fillClrLst meth="repeat">
+      <a:schemeClr val="accent1"/>
+    </dgm:fillClrLst>
+    <dgm:linClrLst meth="repeat">
+      <a:schemeClr val="accent1"/>
+    </dgm:linClrLst>
+    <dgm:effectClrLst/>
+    <dgm:txLinClrLst/>
+    <dgm:txFillClrLst meth="repeat">
+      <a:schemeClr val="lt1"/>
+    </dgm:txFillClrLst>
+    <dgm:txEffectClrLst/>
+  </dgm:styleLbl>
+  <dgm:styleLbl name="parChTrans1D1">
+    <dgm:fillClrLst meth="repeat">
+      <a:schemeClr val="accent1"/>
+    </dgm:fillClrLst>
+    <dgm:linClrLst meth="repeat">
+      <a:schemeClr val="accent1">
+        <a:shade val="60000"/>
+      </a:schemeClr>
+    </dgm:linClrLst>
+    <dgm:effectClrLst/>
+    <dgm:txLinClrLst/>
+    <dgm:txFillClrLst meth="repeat">
+      <a:schemeClr val="tx1"/>
+    </dgm:txFillClrLst>
+    <dgm:txEffectClrLst/>
+  </dgm:styleLbl>
+  <dgm:styleLbl name="parChTrans1D2">
+    <dgm:fillClrLst meth="repeat">
+      <a:schemeClr val="accent1"/>
+    </dgm:fillClrLst>
+    <dgm:linClrLst meth="repeat">
+      <a:schemeClr val="accent1">
+        <a:shade val="60000"/>
+      </a:schemeClr>
+    </dgm:linClrLst>
+    <dgm:effectClrLst/>
+    <dgm:txLinClrLst/>
+    <dgm:txFillClrLst meth="repeat">
+      <a:schemeClr val="tx1"/>
+    </dgm:txFillClrLst>
+    <dgm:txEffectClrLst/>
+  </dgm:styleLbl>
+  <dgm:styleLbl name="parChTrans1D3">
+    <dgm:fillClrLst meth="repeat">
+      <a:schemeClr val="accent1"/>
+    </dgm:fillClrLst>
+    <dgm:linClrLst meth="repeat">
+      <a:schemeClr val="accent1">
+        <a:shade val="80000"/>
+      </a:schemeClr>
+    </dgm:linClrLst>
+    <dgm:effectClrLst/>
+    <dgm:txLinClrLst/>
+    <dgm:txFillClrLst meth="repeat">
+      <a:schemeClr val="tx1"/>
+    </dgm:txFillClrLst>
+    <dgm:txEffectClrLst/>
+  </dgm:styleLbl>
+  <dgm:styleLbl name="parChTrans1D4">
+    <dgm:fillClrLst meth="repeat">
+      <a:schemeClr val="accent1"/>
+    </dgm:fillClrLst>
+    <dgm:linClrLst meth="repeat">
+      <a:schemeClr val="accent1">
+        <a:shade val="80000"/>
+      </a:schemeClr>
+    </dgm:linClrLst>
+    <dgm:effectClrLst/>
+    <dgm:txLinClrLst/>
+    <dgm:txFillClrLst meth="repeat">
+      <a:schemeClr val="tx1"/>
+    </dgm:txFillClrLst>
+    <dgm:txEffectClrLst/>
+  </dgm:styleLbl>
+  <dgm:styleLbl name="fgAcc1">
+    <dgm:fillClrLst meth="repeat">
+      <a:schemeClr val="lt1">
+        <a:alpha val="90000"/>
+      </a:schemeClr>
+    </dgm:fillClrLst>
+    <dgm:linClrLst meth="repeat">
+      <a:schemeClr val="accent1"/>
+    </dgm:linClrLst>
+    <dgm:effectClrLst/>
+    <dgm:txLinClrLst/>
+    <dgm:txFillClrLst meth="repeat">
+      <a:schemeClr val="dk1"/>
+    </dgm:txFillClrLst>
+    <dgm:txEffectClrLst/>
+  </dgm:styleLbl>
+  <dgm:styleLbl name="conFgAcc1">
+    <dgm:fillClrLst meth="repeat">
+      <a:schemeClr val="lt1">
+        <a:alpha val="90000"/>
+      </a:schemeClr>
+    </dgm:fillClrLst>
+    <dgm:linClrLst meth="repeat">
+      <a:schemeClr val="accent1"/>
+    </dgm:linClrLst>
+    <dgm:effectClrLst/>
+    <dgm:txLinClrLst/>
+    <dgm:txFillClrLst meth="repeat">
+      <a:schemeClr val="dk1"/>
+    </dgm:txFillClrLst>
+    <dgm:txEffectClrLst/>
+  </dgm:styleLbl>
+  <dgm:styleLbl name="alignAcc1">
+    <dgm:fillClrLst meth="repeat">
+      <a:schemeClr val="lt1">
+        <a:alpha val="90000"/>
+      </a:schemeClr>
+    </dgm:fillClrLst>
+    <dgm:linClrLst meth="repeat">
+      <a:schemeClr val="accent1"/>
+    </dgm:linClrLst>
+    <dgm:effectClrLst/>
+    <dgm:txLinClrLst/>
+    <dgm:txFillClrLst meth="repeat">
+      <a:schemeClr val="dk1"/>
+    </dgm:txFillClrLst>
+    <dgm:txEffectClrLst/>
+  </dgm:styleLbl>
+  <dgm:styleLbl name="trAlignAcc1">
+    <dgm:fillClrLst meth="repeat">
+      <a:schemeClr val="lt1">
+        <a:alpha val="40000"/>
+      </a:schemeClr>
+    </dgm:fillClrLst>
+    <dgm:linClrLst meth="repeat">
+      <a:schemeClr val="accent1"/>
+    </dgm:linClrLst>
+    <dgm:effectClrLst/>
+    <dgm:txLinClrLst/>
+    <dgm:txFillClrLst meth="repeat">
+      <a:schemeClr val="dk1"/>
+    </dgm:txFillClrLst>
+    <dgm:txEffectClrLst/>
+  </dgm:styleLbl>
+  <dgm:styleLbl name="bgAcc1">
+    <dgm:fillClrLst meth="repeat">
+      <a:schemeClr val="lt1">
+        <a:alpha val="90000"/>
+      </a:schemeClr>
+    </dgm:fillClrLst>
+    <dgm:linClrLst meth="repeat">
+      <a:schemeClr val="accent1"/>
+    </dgm:linClrLst>
+    <dgm:effectClrLst/>
+    <dgm:txLinClrLst/>
+    <dgm:txFillClrLst meth="repeat">
+      <a:schemeClr val="dk1"/>
+    </dgm:txFillClrLst>
+    <dgm:txEffectClrLst/>
+  </dgm:styleLbl>
+  <dgm:styleLbl name="solidFgAcc1">
+    <dgm:fillClrLst meth="repeat">
+      <a:schemeClr val="lt1"/>
+    </dgm:fillClrLst>
+    <dgm:linClrLst meth="repeat">
+      <a:schemeClr val="accent1"/>
+    </dgm:linClrLst>
+    <dgm:effectClrLst/>
+    <dgm:txLinClrLst/>
+    <dgm:txFillClrLst meth="repeat">
+      <a:schemeClr val="dk1"/>
+    </dgm:txFillClrLst>
+    <dgm:txEffectClrLst/>
+  </dgm:styleLbl>
+  <dgm:styleLbl name="solidAlignAcc1">
+    <dgm:fillClrLst meth="repeat">
+      <a:schemeClr val="lt1"/>
+    </dgm:fillClrLst>
+    <dgm:linClrLst meth="repeat">
+      <a:schemeClr val="accent1"/>
+    </dgm:linClrLst>
+    <dgm:effectClrLst/>
+    <dgm:txLinClrLst/>
+    <dgm:txFillClrLst meth="repeat">
+      <a:schemeClr val="dk1"/>
+    </dgm:txFillClrLst>
+    <dgm:txEffectClrLst/>
+  </dgm:styleLbl>
+  <dgm:styleLbl name="solidBgAcc1">
+    <dgm:fillClrLst meth="repeat">
+      <a:schemeClr val="lt1"/>
+    </dgm:fillClrLst>
+    <dgm:linClrLst meth="repeat">
+      <a:schemeClr val="accent1"/>
+    </dgm:linClrLst>
+    <dgm:effectClrLst/>
+    <dgm:txLinClrLst/>
+    <dgm:txFillClrLst meth="repeat">
+      <a:schemeClr val="dk1"/>
+    </dgm:txFillClrLst>
+    <dgm:txEffectClrLst/>
+  </dgm:styleLbl>
+  <dgm:styleLbl name="fgAccFollowNode1">
+    <dgm:fillClrLst meth="repeat">
+      <a:schemeClr val="accent1">
+        <a:alpha val="90000"/>
+        <a:tint val="40000"/>
+      </a:schemeClr>
+    </dgm:fillClrLst>
+    <dgm:linClrLst meth="repeat">
+      <a:schemeClr val="accent1">
+        <a:alpha val="90000"/>
+        <a:tint val="40000"/>
+      </a:schemeClr>
+    </dgm:linClrLst>
+    <dgm:effectClrLst/>
+    <dgm:txLinClrLst/>
+    <dgm:txFillClrLst meth="repeat">
+      <a:schemeClr val="dk1"/>
+    </dgm:txFillClrLst>
+    <dgm:txEffectClrLst/>
+  </dgm:styleLbl>
+  <dgm:styleLbl name="alignAccFollowNode1">
+    <dgm:fillClrLst meth="repeat">
+      <a:schemeClr val="accent1">
+        <a:alpha val="90000"/>
+        <a:tint val="40000"/>
+      </a:schemeClr>
+    </dgm:fillClrLst>
+    <dgm:linClrLst meth="repeat">
+      <a:schemeClr val="accent1">
+        <a:alpha val="90000"/>
+        <a:tint val="40000"/>
+      </a:schemeClr>
+    </dgm:linClrLst>
+    <dgm:effectClrLst/>
+    <dgm:txLinClrLst/>
+    <dgm:txFillClrLst meth="repeat">
+      <a:schemeClr val="dk1"/>
+    </dgm:txFillClrLst>
+    <dgm:txEffectClrLst/>
+  </dgm:styleLbl>
+  <dgm:styleLbl name="bgAccFollowNode1">
+    <dgm:fillClrLst meth="repeat">
+      <a:schemeClr val="accent1">
+        <a:alpha val="90000"/>
+        <a:tint val="40000"/>
+      </a:schemeClr>
+    </dgm:fillClrLst>
+    <dgm:linClrLst meth="repeat">
+      <a:schemeClr val="accent1">
+        <a:alpha val="90000"/>
+        <a:tint val="40000"/>
+      </a:schemeClr>
+    </dgm:linClrLst>
+    <dgm:effectClrLst/>
+    <dgm:txLinClrLst/>
+    <dgm:txFillClrLst meth="repeat">
+      <a:schemeClr val="dk1"/>
+    </dgm:txFillClrLst>
+    <dgm:txEffectClrLst/>
+  </dgm:styleLbl>
+  <dgm:styleLbl name="fgAcc0">
+    <dgm:fillClrLst meth="repeat">
+      <a:schemeClr val="lt1">
+        <a:alpha val="90000"/>
+      </a:schemeClr>
+    </dgm:fillClrLst>
+    <dgm:linClrLst meth="repeat">
+      <a:schemeClr val="accent1"/>
+    </dgm:linClrLst>
+    <dgm:effectClrLst/>
+    <dgm:txLinClrLst/>
+    <dgm:txFillClrLst meth="repeat">
+      <a:schemeClr val="dk1"/>
+    </dgm:txFillClrLst>
+    <dgm:txEffectClrLst/>
+  </dgm:styleLbl>
+  <dgm:styleLbl name="fgAcc2">
+    <dgm:fillClrLst meth="repeat">
+      <a:schemeClr val="lt1">
+        <a:alpha val="90000"/>
+      </a:schemeClr>
+    </dgm:fillClrLst>
+    <dgm:linClrLst meth="repeat">
+      <a:schemeClr val="accent1"/>
+    </dgm:linClrLst>
+    <dgm:effectClrLst/>
+    <dgm:txLinClrLst/>
+    <dgm:txFillClrLst meth="repeat">
+      <a:schemeClr val="dk1"/>
+    </dgm:txFillClrLst>
+    <dgm:txEffectClrLst/>
+  </dgm:styleLbl>
+  <dgm:styleLbl name="fgAcc3">
+    <dgm:fillClrLst meth="repeat">
+      <a:schemeClr val="lt1">
+        <a:alpha val="90000"/>
+      </a:schemeClr>
+    </dgm:fillClrLst>
+    <dgm:linClrLst meth="repeat">
+      <a:schemeClr val="accent1"/>
+    </dgm:linClrLst>
+    <dgm:effectClrLst/>
+    <dgm:txLinClrLst/>
+    <dgm:txFillClrLst meth="repeat">
+      <a:schemeClr val="dk1"/>
+    </dgm:txFillClrLst>
+    <dgm:txEffectClrLst/>
+  </dgm:styleLbl>
+  <dgm:styleLbl name="fgAcc4">
+    <dgm:fillClrLst meth="repeat">
+      <a:schemeClr val="lt1">
+        <a:alpha val="90000"/>
+      </a:schemeClr>
+    </dgm:fillClrLst>
+    <dgm:linClrLst meth="repeat">
+      <a:schemeClr val="accent1"/>
+    </dgm:linClrLst>
+    <dgm:effectClrLst/>
+    <dgm:txLinClrLst/>
+    <dgm:txFillClrLst meth="repeat">
+      <a:schemeClr val="dk1"/>
+    </dgm:txFillClrLst>
+    <dgm:txEffectClrLst/>
+  </dgm:styleLbl>
+  <dgm:styleLbl name="bgShp">
+    <dgm:fillClrLst meth="repeat">
+      <a:schemeClr val="accent1">
+        <a:tint val="40000"/>
+      </a:schemeClr>
+    </dgm:fillClrLst>
+    <dgm:linClrLst meth="repeat">
+      <a:schemeClr val="accent1"/>
+    </dgm:linClrLst>
+    <dgm:effectClrLst/>
+    <dgm:txLinClrLst/>
+    <dgm:txFillClrLst meth="repeat">
+      <a:schemeClr val="dk1"/>
+    </dgm:txFillClrLst>
+    <dgm:txEffectClrLst/>
+  </dgm:styleLbl>
+  <dgm:styleLbl name="dkBgShp">
+    <dgm:fillClrLst meth="repeat">
+      <a:schemeClr val="accent1">
+        <a:shade val="80000"/>
+      </a:schemeClr>
+    </dgm:fillClrLst>
+    <dgm:linClrLst meth="repeat">
+      <a:schemeClr val="accent1"/>
+    </dgm:linClrLst>
+    <dgm:effectClrLst/>
+    <dgm:txLinClrLst/>
+    <dgm:txFillClrLst meth="repeat">
+      <a:schemeClr val="lt1"/>
+    </dgm:txFillClrLst>
+    <dgm:txEffectClrLst/>
+  </dgm:styleLbl>
+  <dgm:styleLbl name="trBgShp">
+    <dgm:fillClrLst meth="repeat">
+      <a:schemeClr val="accent1">
+        <a:tint val="50000"/>
+        <a:alpha val="40000"/>
+      </a:schemeClr>
+    </dgm:fillClrLst>
+    <dgm:linClrLst meth="repeat">
+      <a:schemeClr val="accent1"/>
+    </dgm:linClrLst>
+    <dgm:effectClrLst/>
+    <dgm:txLinClrLst/>
+    <dgm:txFillClrLst meth="repeat">
+      <a:schemeClr val="lt1"/>
+    </dgm:txFillClrLst>
+    <dgm:txEffectClrLst/>
+  </dgm:styleLbl>
+  <dgm:styleLbl name="fgShp">
+    <dgm:fillClrLst meth="repeat">
+      <a:schemeClr val="accent1">
+        <a:tint val="60000"/>
+      </a:schemeClr>
+    </dgm:fillClrLst>
+    <dgm:linClrLst meth="repeat">
+      <a:schemeClr val="lt1"/>
+    </dgm:linClrLst>
+    <dgm:effectClrLst/>
+    <dgm:txLinClrLst/>
+    <dgm:txFillClrLst meth="repeat">
+      <a:schemeClr val="dk1"/>
+    </dgm:txFillClrLst>
+    <dgm:txEffectClrLst/>
+  </dgm:styleLbl>
+  <dgm:styleLbl name="revTx">
+    <dgm:fillClrLst meth="repeat">
+      <a:schemeClr val="lt1">
+        <a:alpha val="0"/>
+      </a:schemeClr>
+    </dgm:fillClrLst>
+    <dgm:linClrLst meth="repeat">
+      <a:schemeClr val="dk1">
+        <a:alpha val="0"/>
+      </a:schemeClr>
+    </dgm:linClrLst>
+    <dgm:effectClrLst/>
+    <dgm:txLinClrLst/>
+    <dgm:txFillClrLst meth="repeat">
+      <a:schemeClr val="tx1"/>
+    </dgm:txFillClrLst>
+    <dgm:txEffectClrLst/>
+  </dgm:styleLbl>
+</dgm:colorsDef>
+</file>
+
+<file path=ppt/diagrams/colors2.xml><?xml version="1.0" encoding="utf-8"?>
 <dgm:colorsDef xmlns:dgm="http://schemas.openxmlformats.org/drawingml/2006/diagram" xmlns:a="http://schemas.openxmlformats.org/drawingml/2006/main" uniqueId="urn:microsoft.com/office/officeart/2005/8/colors/accent1_2">
   <dgm:title val=""/>
   <dgm:desc val=""/>
@@ -1892,6 +2640,333 @@
     <dgm:cxn modelId="{54AA12ED-C7F3-4ABE-B2C5-93C26C05F028}" type="presParOf" srcId="{00746E33-8124-4FC9-A56B-505AAD94B3E9}" destId="{35EE2C8C-A18E-41F3-BBBF-9AA903F5EA6E}" srcOrd="2" destOrd="0" presId="urn:microsoft.com/office/officeart/2005/8/layout/orgChart1"/>
     <dgm:cxn modelId="{BFD17B4B-B2CC-497F-B10A-AE4233933783}" type="presParOf" srcId="{3058322C-3A4D-43F2-8D5D-7FF0F10A54F7}" destId="{3BCA989F-B435-41AC-BA96-5E467C2A93A7}" srcOrd="2" destOrd="0" presId="urn:microsoft.com/office/officeart/2005/8/layout/orgChart1"/>
     <dgm:cxn modelId="{60CCEEAD-408D-47C3-8B2F-A0CE5D0C346A}" type="presParOf" srcId="{A6C33E9B-FF23-4F43-9A38-93782970D1C8}" destId="{36EAA9A2-A421-490F-B904-AFD40BDFAAE1}" srcOrd="2" destOrd="0" presId="urn:microsoft.com/office/officeart/2005/8/layout/orgChart1"/>
+  </dgm:cxnLst>
+  <dgm:bg/>
+  <dgm:whole/>
+  <dgm:extLst>
+    <a:ext uri="http://schemas.microsoft.com/office/drawing/2008/diagram">
+      <dsp:dataModelExt xmlns:dsp="http://schemas.microsoft.com/office/drawing/2008/diagram" relId="rId6" minVer="http://schemas.openxmlformats.org/drawingml/2006/diagram"/>
+    </a:ext>
+  </dgm:extLst>
+</dgm:dataModel>
+</file>
+
+<file path=ppt/diagrams/data2.xml><?xml version="1.0" encoding="utf-8"?>
+<dgm:dataModel xmlns:dgm="http://schemas.openxmlformats.org/drawingml/2006/diagram" xmlns:a="http://schemas.openxmlformats.org/drawingml/2006/main">
+  <dgm:ptLst>
+    <dgm:pt modelId="{26A4D33A-6698-41E1-A4D8-D295C126DDB4}" type="doc">
+      <dgm:prSet loTypeId="urn:microsoft.com/office/officeart/2005/8/layout/process1" loCatId="process" qsTypeId="urn:microsoft.com/office/officeart/2005/8/quickstyle/simple1" qsCatId="simple" csTypeId="urn:microsoft.com/office/officeart/2005/8/colors/accent1_2" csCatId="accent1" phldr="1"/>
+      <dgm:spPr/>
+    </dgm:pt>
+    <dgm:pt modelId="{9CD0CC31-2F02-49EC-95BF-2FC7329CE2D1}">
+      <dgm:prSet phldrT="[Text]"/>
+      <dgm:spPr/>
+      <dgm:t>
+        <a:bodyPr/>
+        <a:lstStyle/>
+        <a:p>
+          <a:r>
+            <a:rPr lang="en-US" dirty="0"/>
+            <a:t>Run Tracer</a:t>
+          </a:r>
+          <a:br>
+            <a:rPr lang="en-US" dirty="0"/>
+          </a:br>
+          <a:br>
+            <a:rPr lang="en-US" dirty="0"/>
+          </a:br>
+          <a:r>
+            <a:rPr lang="en-US" dirty="0"/>
+            <a:t>Gen </a:t>
+          </a:r>
+          <a:r>
+            <a:rPr lang="en-US" dirty="0" err="1"/>
+            <a:t>URS→SyRS</a:t>
+          </a:r>
+          <a:r>
+            <a:rPr lang="en-US" dirty="0"/>
+            <a:t> concordance</a:t>
+          </a:r>
+        </a:p>
+      </dgm:t>
+    </dgm:pt>
+    <dgm:pt modelId="{B8735930-CE1C-4943-AF67-6EDA759C8786}" type="parTrans" cxnId="{A67F23AD-6403-4962-B45E-30D239313E19}">
+      <dgm:prSet/>
+      <dgm:spPr/>
+      <dgm:t>
+        <a:bodyPr/>
+        <a:lstStyle/>
+        <a:p>
+          <a:endParaRPr lang="en-US"/>
+        </a:p>
+      </dgm:t>
+    </dgm:pt>
+    <dgm:pt modelId="{C007D24A-128A-497C-BAA0-CA30572AA98E}" type="sibTrans" cxnId="{A67F23AD-6403-4962-B45E-30D239313E19}">
+      <dgm:prSet/>
+      <dgm:spPr/>
+      <dgm:t>
+        <a:bodyPr/>
+        <a:lstStyle/>
+        <a:p>
+          <a:endParaRPr lang="en-US"/>
+        </a:p>
+      </dgm:t>
+    </dgm:pt>
+    <dgm:pt modelId="{2DBA65E2-C956-4357-A7B4-1B4212404E8B}">
+      <dgm:prSet phldrT="[Text]"/>
+      <dgm:spPr/>
+      <dgm:t>
+        <a:bodyPr/>
+        <a:lstStyle/>
+        <a:p>
+          <a:r>
+            <a:rPr lang="en-US" dirty="0"/>
+            <a:t>Run PythonTracer4</a:t>
+          </a:r>
+          <a:br>
+            <a:rPr lang="en-US" dirty="0"/>
+          </a:br>
+          <a:br>
+            <a:rPr lang="en-US" dirty="0"/>
+          </a:br>
+          <a:r>
+            <a:rPr lang="en-US" dirty="0"/>
+            <a:t>Split </a:t>
+          </a:r>
+          <a:r>
+            <a:rPr lang="en-US" dirty="0" err="1"/>
+            <a:t>URS→SyRS</a:t>
+          </a:r>
+          <a:r>
+            <a:rPr lang="en-US" dirty="0"/>
+            <a:t> split by </a:t>
+          </a:r>
+          <a:r>
+            <a:rPr lang="en-US" dirty="0" err="1"/>
+            <a:t>SyRS</a:t>
+          </a:r>
+          <a:endParaRPr lang="en-US" dirty="0"/>
+        </a:p>
+      </dgm:t>
+    </dgm:pt>
+    <dgm:pt modelId="{85EAB236-2E1F-4661-82A5-308B5BBE249A}" type="parTrans" cxnId="{7FD96A0D-A3D5-49E0-9EBB-6C99364DB93A}">
+      <dgm:prSet/>
+      <dgm:spPr/>
+      <dgm:t>
+        <a:bodyPr/>
+        <a:lstStyle/>
+        <a:p>
+          <a:endParaRPr lang="en-US"/>
+        </a:p>
+      </dgm:t>
+    </dgm:pt>
+    <dgm:pt modelId="{ED8EFDE7-5ADD-4AFA-9DC7-EB95848295B4}" type="sibTrans" cxnId="{7FD96A0D-A3D5-49E0-9EBB-6C99364DB93A}">
+      <dgm:prSet/>
+      <dgm:spPr/>
+      <dgm:t>
+        <a:bodyPr/>
+        <a:lstStyle/>
+        <a:p>
+          <a:endParaRPr lang="en-US"/>
+        </a:p>
+      </dgm:t>
+    </dgm:pt>
+    <dgm:pt modelId="{443F902E-08B1-48DC-8456-5136AAE77F5F}">
+      <dgm:prSet phldrT="[Text]"/>
+      <dgm:spPr/>
+      <dgm:t>
+        <a:bodyPr/>
+        <a:lstStyle/>
+        <a:p>
+          <a:r>
+            <a:rPr lang="en-US" dirty="0"/>
+            <a:t>Run </a:t>
+          </a:r>
+          <a:r>
+            <a:rPr lang="en-US" dirty="0" err="1"/>
+            <a:t>TraceReport</a:t>
+          </a:r>
+          <a:br>
+            <a:rPr lang="en-US" dirty="0"/>
+          </a:br>
+          <a:br>
+            <a:rPr lang="en-US" dirty="0"/>
+          </a:br>
+          <a:r>
+            <a:rPr lang="en-US" dirty="0"/>
+            <a:t>Generate </a:t>
+          </a:r>
+          <a:r>
+            <a:rPr lang="en-US" dirty="0" err="1"/>
+            <a:t>URS→SyRS→TestCase</a:t>
+          </a:r>
+          <a:endParaRPr lang="en-US" dirty="0"/>
+        </a:p>
+      </dgm:t>
+    </dgm:pt>
+    <dgm:pt modelId="{5FE80C11-5EA3-4B85-A136-995E4D335BC2}" type="parTrans" cxnId="{614460B7-8E3C-482D-8E31-AD9366C8DB1B}">
+      <dgm:prSet/>
+      <dgm:spPr/>
+      <dgm:t>
+        <a:bodyPr/>
+        <a:lstStyle/>
+        <a:p>
+          <a:endParaRPr lang="en-US"/>
+        </a:p>
+      </dgm:t>
+    </dgm:pt>
+    <dgm:pt modelId="{B6F6A012-8CC7-40F3-8EBA-222B0104051F}" type="sibTrans" cxnId="{614460B7-8E3C-482D-8E31-AD9366C8DB1B}">
+      <dgm:prSet/>
+      <dgm:spPr/>
+      <dgm:t>
+        <a:bodyPr/>
+        <a:lstStyle/>
+        <a:p>
+          <a:endParaRPr lang="en-US"/>
+        </a:p>
+      </dgm:t>
+    </dgm:pt>
+    <dgm:pt modelId="{5C3C38C2-4298-426F-9711-3E861D4508B8}">
+      <dgm:prSet phldrT="[Text]"/>
+      <dgm:spPr/>
+      <dgm:t>
+        <a:bodyPr/>
+        <a:lstStyle/>
+        <a:p>
+          <a:r>
+            <a:rPr lang="en-US" dirty="0"/>
+            <a:t>Export Requirements from </a:t>
+          </a:r>
+          <a:r>
+            <a:rPr lang="en-US" dirty="0" err="1"/>
+            <a:t>SyRS</a:t>
+          </a:r>
+          <a:r>
+            <a:rPr lang="en-US" dirty="0"/>
+            <a:t> </a:t>
+          </a:r>
+          <a:r>
+            <a:rPr lang="en-US"/>
+            <a:t>with links to URS</a:t>
+          </a:r>
+          <a:endParaRPr lang="en-US" dirty="0"/>
+        </a:p>
+      </dgm:t>
+    </dgm:pt>
+    <dgm:pt modelId="{8B88D83F-AAB2-48BC-B0DC-C7F885EDDFD8}" type="parTrans" cxnId="{C92D828A-8ECC-4EE4-8F05-B809BF9037C0}">
+      <dgm:prSet/>
+      <dgm:spPr/>
+      <dgm:t>
+        <a:bodyPr/>
+        <a:lstStyle/>
+        <a:p>
+          <a:endParaRPr lang="en-US"/>
+        </a:p>
+      </dgm:t>
+    </dgm:pt>
+    <dgm:pt modelId="{88BED050-77FE-4F2D-A36A-6DCF8AEDA344}" type="sibTrans" cxnId="{C92D828A-8ECC-4EE4-8F05-B809BF9037C0}">
+      <dgm:prSet/>
+      <dgm:spPr/>
+      <dgm:t>
+        <a:bodyPr/>
+        <a:lstStyle/>
+        <a:p>
+          <a:endParaRPr lang="en-US"/>
+        </a:p>
+      </dgm:t>
+    </dgm:pt>
+    <dgm:pt modelId="{DC7F5626-BEFE-4647-BEE6-C5F4A8B72D6C}" type="pres">
+      <dgm:prSet presAssocID="{26A4D33A-6698-41E1-A4D8-D295C126DDB4}" presName="Name0" presStyleCnt="0">
+        <dgm:presLayoutVars>
+          <dgm:dir/>
+          <dgm:resizeHandles val="exact"/>
+        </dgm:presLayoutVars>
+      </dgm:prSet>
+      <dgm:spPr/>
+    </dgm:pt>
+    <dgm:pt modelId="{C342DE24-9D94-440B-8B66-06C95FDBFBB5}" type="pres">
+      <dgm:prSet presAssocID="{5C3C38C2-4298-426F-9711-3E861D4508B8}" presName="node" presStyleLbl="node1" presStyleIdx="0" presStyleCnt="4">
+        <dgm:presLayoutVars>
+          <dgm:bulletEnabled val="1"/>
+        </dgm:presLayoutVars>
+      </dgm:prSet>
+      <dgm:spPr/>
+    </dgm:pt>
+    <dgm:pt modelId="{2C4F80CE-50C5-43C1-B9EA-9E8EA0A30832}" type="pres">
+      <dgm:prSet presAssocID="{88BED050-77FE-4F2D-A36A-6DCF8AEDA344}" presName="sibTrans" presStyleLbl="sibTrans2D1" presStyleIdx="0" presStyleCnt="3"/>
+      <dgm:spPr/>
+    </dgm:pt>
+    <dgm:pt modelId="{8CEF6FFD-DA55-44FF-8F03-BC2F0B7DDF2E}" type="pres">
+      <dgm:prSet presAssocID="{88BED050-77FE-4F2D-A36A-6DCF8AEDA344}" presName="connectorText" presStyleLbl="sibTrans2D1" presStyleIdx="0" presStyleCnt="3"/>
+      <dgm:spPr/>
+    </dgm:pt>
+    <dgm:pt modelId="{00E8D648-E404-4F01-817B-CCD37480E7AC}" type="pres">
+      <dgm:prSet presAssocID="{9CD0CC31-2F02-49EC-95BF-2FC7329CE2D1}" presName="node" presStyleLbl="node1" presStyleIdx="1" presStyleCnt="4" custScaleY="164444">
+        <dgm:presLayoutVars>
+          <dgm:bulletEnabled val="1"/>
+        </dgm:presLayoutVars>
+      </dgm:prSet>
+      <dgm:spPr/>
+    </dgm:pt>
+    <dgm:pt modelId="{CE0C6F9C-E8B5-4074-90A0-9EF85FA94BAF}" type="pres">
+      <dgm:prSet presAssocID="{C007D24A-128A-497C-BAA0-CA30572AA98E}" presName="sibTrans" presStyleLbl="sibTrans2D1" presStyleIdx="1" presStyleCnt="3"/>
+      <dgm:spPr/>
+    </dgm:pt>
+    <dgm:pt modelId="{6582857F-6444-4308-958C-0C18DE2AA562}" type="pres">
+      <dgm:prSet presAssocID="{C007D24A-128A-497C-BAA0-CA30572AA98E}" presName="connectorText" presStyleLbl="sibTrans2D1" presStyleIdx="1" presStyleCnt="3"/>
+      <dgm:spPr/>
+    </dgm:pt>
+    <dgm:pt modelId="{F27E3628-B139-44D2-9764-152DFAC999E2}" type="pres">
+      <dgm:prSet presAssocID="{2DBA65E2-C956-4357-A7B4-1B4212404E8B}" presName="node" presStyleLbl="node1" presStyleIdx="2" presStyleCnt="4" custScaleY="168642">
+        <dgm:presLayoutVars>
+          <dgm:bulletEnabled val="1"/>
+        </dgm:presLayoutVars>
+      </dgm:prSet>
+      <dgm:spPr/>
+    </dgm:pt>
+    <dgm:pt modelId="{0C33758C-79EC-4BE8-A1A8-22AAF0BE940E}" type="pres">
+      <dgm:prSet presAssocID="{ED8EFDE7-5ADD-4AFA-9DC7-EB95848295B4}" presName="sibTrans" presStyleLbl="sibTrans2D1" presStyleIdx="2" presStyleCnt="3"/>
+      <dgm:spPr/>
+    </dgm:pt>
+    <dgm:pt modelId="{89D417A6-3D85-450A-91CB-061CA0FD34F9}" type="pres">
+      <dgm:prSet presAssocID="{ED8EFDE7-5ADD-4AFA-9DC7-EB95848295B4}" presName="connectorText" presStyleLbl="sibTrans2D1" presStyleIdx="2" presStyleCnt="3"/>
+      <dgm:spPr/>
+    </dgm:pt>
+    <dgm:pt modelId="{EEE0A0A3-0810-4336-B288-D5BE5803D451}" type="pres">
+      <dgm:prSet presAssocID="{443F902E-08B1-48DC-8456-5136AAE77F5F}" presName="node" presStyleLbl="node1" presStyleIdx="3" presStyleCnt="4" custScaleY="157446">
+        <dgm:presLayoutVars>
+          <dgm:bulletEnabled val="1"/>
+        </dgm:presLayoutVars>
+      </dgm:prSet>
+      <dgm:spPr/>
+    </dgm:pt>
+  </dgm:ptLst>
+  <dgm:cxnLst>
+    <dgm:cxn modelId="{7FD96A0D-A3D5-49E0-9EBB-6C99364DB93A}" srcId="{26A4D33A-6698-41E1-A4D8-D295C126DDB4}" destId="{2DBA65E2-C956-4357-A7B4-1B4212404E8B}" srcOrd="2" destOrd="0" parTransId="{85EAB236-2E1F-4661-82A5-308B5BBE249A}" sibTransId="{ED8EFDE7-5ADD-4AFA-9DC7-EB95848295B4}"/>
+    <dgm:cxn modelId="{81729536-4A3B-42E3-BD04-D576B96EFA47}" type="presOf" srcId="{26A4D33A-6698-41E1-A4D8-D295C126DDB4}" destId="{DC7F5626-BEFE-4647-BEE6-C5F4A8B72D6C}" srcOrd="0" destOrd="0" presId="urn:microsoft.com/office/officeart/2005/8/layout/process1"/>
+    <dgm:cxn modelId="{75DF3C40-D36A-4FD7-9DEE-11120673A5BD}" type="presOf" srcId="{88BED050-77FE-4F2D-A36A-6DCF8AEDA344}" destId="{2C4F80CE-50C5-43C1-B9EA-9E8EA0A30832}" srcOrd="0" destOrd="0" presId="urn:microsoft.com/office/officeart/2005/8/layout/process1"/>
+    <dgm:cxn modelId="{37952C41-1237-42CC-B31E-2B8FBE6498FC}" type="presOf" srcId="{5C3C38C2-4298-426F-9711-3E861D4508B8}" destId="{C342DE24-9D94-440B-8B66-06C95FDBFBB5}" srcOrd="0" destOrd="0" presId="urn:microsoft.com/office/officeart/2005/8/layout/process1"/>
+    <dgm:cxn modelId="{23AC9B68-7CF1-450A-9C0D-EBD65D59EAA7}" type="presOf" srcId="{ED8EFDE7-5ADD-4AFA-9DC7-EB95848295B4}" destId="{0C33758C-79EC-4BE8-A1A8-22AAF0BE940E}" srcOrd="0" destOrd="0" presId="urn:microsoft.com/office/officeart/2005/8/layout/process1"/>
+    <dgm:cxn modelId="{AEA80F53-7522-446B-A132-E91177E848D3}" type="presOf" srcId="{ED8EFDE7-5ADD-4AFA-9DC7-EB95848295B4}" destId="{89D417A6-3D85-450A-91CB-061CA0FD34F9}" srcOrd="1" destOrd="0" presId="urn:microsoft.com/office/officeart/2005/8/layout/process1"/>
+    <dgm:cxn modelId="{EC9F2457-78C3-49DB-B93A-6B48C0F11766}" type="presOf" srcId="{443F902E-08B1-48DC-8456-5136AAE77F5F}" destId="{EEE0A0A3-0810-4336-B288-D5BE5803D451}" srcOrd="0" destOrd="0" presId="urn:microsoft.com/office/officeart/2005/8/layout/process1"/>
+    <dgm:cxn modelId="{C92D828A-8ECC-4EE4-8F05-B809BF9037C0}" srcId="{26A4D33A-6698-41E1-A4D8-D295C126DDB4}" destId="{5C3C38C2-4298-426F-9711-3E861D4508B8}" srcOrd="0" destOrd="0" parTransId="{8B88D83F-AAB2-48BC-B0DC-C7F885EDDFD8}" sibTransId="{88BED050-77FE-4F2D-A36A-6DCF8AEDA344}"/>
+    <dgm:cxn modelId="{384EF98C-1C9A-4B3F-8147-982D3FD079C6}" type="presOf" srcId="{C007D24A-128A-497C-BAA0-CA30572AA98E}" destId="{CE0C6F9C-E8B5-4074-90A0-9EF85FA94BAF}" srcOrd="0" destOrd="0" presId="urn:microsoft.com/office/officeart/2005/8/layout/process1"/>
+    <dgm:cxn modelId="{571E7E99-BFC5-412F-A706-34324668D668}" type="presOf" srcId="{9CD0CC31-2F02-49EC-95BF-2FC7329CE2D1}" destId="{00E8D648-E404-4F01-817B-CCD37480E7AC}" srcOrd="0" destOrd="0" presId="urn:microsoft.com/office/officeart/2005/8/layout/process1"/>
+    <dgm:cxn modelId="{C11FE7A1-BBC3-4D17-B2DE-07585DF29753}" type="presOf" srcId="{C007D24A-128A-497C-BAA0-CA30572AA98E}" destId="{6582857F-6444-4308-958C-0C18DE2AA562}" srcOrd="1" destOrd="0" presId="urn:microsoft.com/office/officeart/2005/8/layout/process1"/>
+    <dgm:cxn modelId="{CA4B48A3-4E7F-4ABB-A371-73CA98CE2B78}" type="presOf" srcId="{88BED050-77FE-4F2D-A36A-6DCF8AEDA344}" destId="{8CEF6FFD-DA55-44FF-8F03-BC2F0B7DDF2E}" srcOrd="1" destOrd="0" presId="urn:microsoft.com/office/officeart/2005/8/layout/process1"/>
+    <dgm:cxn modelId="{A67F23AD-6403-4962-B45E-30D239313E19}" srcId="{26A4D33A-6698-41E1-A4D8-D295C126DDB4}" destId="{9CD0CC31-2F02-49EC-95BF-2FC7329CE2D1}" srcOrd="1" destOrd="0" parTransId="{B8735930-CE1C-4943-AF67-6EDA759C8786}" sibTransId="{C007D24A-128A-497C-BAA0-CA30572AA98E}"/>
+    <dgm:cxn modelId="{614460B7-8E3C-482D-8E31-AD9366C8DB1B}" srcId="{26A4D33A-6698-41E1-A4D8-D295C126DDB4}" destId="{443F902E-08B1-48DC-8456-5136AAE77F5F}" srcOrd="3" destOrd="0" parTransId="{5FE80C11-5EA3-4B85-A136-995E4D335BC2}" sibTransId="{B6F6A012-8CC7-40F3-8EBA-222B0104051F}"/>
+    <dgm:cxn modelId="{599392FC-89DE-4572-B576-B47EBA51DAB6}" type="presOf" srcId="{2DBA65E2-C956-4357-A7B4-1B4212404E8B}" destId="{F27E3628-B139-44D2-9764-152DFAC999E2}" srcOrd="0" destOrd="0" presId="urn:microsoft.com/office/officeart/2005/8/layout/process1"/>
+    <dgm:cxn modelId="{3DEE8FC5-0FC3-49A5-A425-F3277D748BEE}" type="presParOf" srcId="{DC7F5626-BEFE-4647-BEE6-C5F4A8B72D6C}" destId="{C342DE24-9D94-440B-8B66-06C95FDBFBB5}" srcOrd="0" destOrd="0" presId="urn:microsoft.com/office/officeart/2005/8/layout/process1"/>
+    <dgm:cxn modelId="{010EA702-7D0F-46C5-BC79-4B5F0BAE6C09}" type="presParOf" srcId="{DC7F5626-BEFE-4647-BEE6-C5F4A8B72D6C}" destId="{2C4F80CE-50C5-43C1-B9EA-9E8EA0A30832}" srcOrd="1" destOrd="0" presId="urn:microsoft.com/office/officeart/2005/8/layout/process1"/>
+    <dgm:cxn modelId="{B5BB92F7-D63E-4E16-9351-39A6C88F8415}" type="presParOf" srcId="{2C4F80CE-50C5-43C1-B9EA-9E8EA0A30832}" destId="{8CEF6FFD-DA55-44FF-8F03-BC2F0B7DDF2E}" srcOrd="0" destOrd="0" presId="urn:microsoft.com/office/officeart/2005/8/layout/process1"/>
+    <dgm:cxn modelId="{C339DCED-A50D-479F-8F7C-BF4539E68122}" type="presParOf" srcId="{DC7F5626-BEFE-4647-BEE6-C5F4A8B72D6C}" destId="{00E8D648-E404-4F01-817B-CCD37480E7AC}" srcOrd="2" destOrd="0" presId="urn:microsoft.com/office/officeart/2005/8/layout/process1"/>
+    <dgm:cxn modelId="{CC01F504-1521-4743-B84A-B86B1EDD4F1E}" type="presParOf" srcId="{DC7F5626-BEFE-4647-BEE6-C5F4A8B72D6C}" destId="{CE0C6F9C-E8B5-4074-90A0-9EF85FA94BAF}" srcOrd="3" destOrd="0" presId="urn:microsoft.com/office/officeart/2005/8/layout/process1"/>
+    <dgm:cxn modelId="{DCC899F2-757F-41C5-9B75-0E993F51176B}" type="presParOf" srcId="{CE0C6F9C-E8B5-4074-90A0-9EF85FA94BAF}" destId="{6582857F-6444-4308-958C-0C18DE2AA562}" srcOrd="0" destOrd="0" presId="urn:microsoft.com/office/officeart/2005/8/layout/process1"/>
+    <dgm:cxn modelId="{3412C78D-0A4A-4197-B9C1-303A0EBBA9DE}" type="presParOf" srcId="{DC7F5626-BEFE-4647-BEE6-C5F4A8B72D6C}" destId="{F27E3628-B139-44D2-9764-152DFAC999E2}" srcOrd="4" destOrd="0" presId="urn:microsoft.com/office/officeart/2005/8/layout/process1"/>
+    <dgm:cxn modelId="{2719A5CD-1478-44FB-9F6F-0571C8346D7B}" type="presParOf" srcId="{DC7F5626-BEFE-4647-BEE6-C5F4A8B72D6C}" destId="{0C33758C-79EC-4BE8-A1A8-22AAF0BE940E}" srcOrd="5" destOrd="0" presId="urn:microsoft.com/office/officeart/2005/8/layout/process1"/>
+    <dgm:cxn modelId="{DCDC05BE-4090-4EB0-93B8-DDE3908AF282}" type="presParOf" srcId="{0C33758C-79EC-4BE8-A1A8-22AAF0BE940E}" destId="{89D417A6-3D85-450A-91CB-061CA0FD34F9}" srcOrd="0" destOrd="0" presId="urn:microsoft.com/office/officeart/2005/8/layout/process1"/>
+    <dgm:cxn modelId="{87B1DCC8-5658-4CCD-B077-B67EE8F47E63}" type="presParOf" srcId="{DC7F5626-BEFE-4647-BEE6-C5F4A8B72D6C}" destId="{EEE0A0A3-0810-4336-B288-D5BE5803D451}" srcOrd="6" destOrd="0" presId="urn:microsoft.com/office/officeart/2005/8/layout/process1"/>
   </dgm:cxnLst>
   <dgm:bg/>
   <dgm:whole/>
@@ -3492,6 +4567,617 @@
 </dsp:drawing>
 </file>
 
+<file path=ppt/diagrams/drawing2.xml><?xml version="1.0" encoding="utf-8"?>
+<dsp:drawing xmlns:dgm="http://schemas.openxmlformats.org/drawingml/2006/diagram" xmlns:dsp="http://schemas.microsoft.com/office/drawing/2008/diagram" xmlns:a="http://schemas.openxmlformats.org/drawingml/2006/main">
+  <dsp:spTree>
+    <dsp:nvGrpSpPr>
+      <dsp:cNvPr id="0" name=""/>
+      <dsp:cNvGrpSpPr/>
+    </dsp:nvGrpSpPr>
+    <dsp:grpSpPr/>
+    <dsp:sp modelId="{C342DE24-9D94-440B-8B66-06C95FDBFBB5}">
+      <dsp:nvSpPr>
+        <dsp:cNvPr id="0" name=""/>
+        <dsp:cNvSpPr/>
+      </dsp:nvSpPr>
+      <dsp:spPr>
+        <a:xfrm>
+          <a:off x="3571" y="2240822"/>
+          <a:ext cx="1561703" cy="937021"/>
+        </a:xfrm>
+        <a:prstGeom prst="roundRect">
+          <a:avLst>
+            <a:gd name="adj" fmla="val 10000"/>
+          </a:avLst>
+        </a:prstGeom>
+        <a:solidFill>
+          <a:schemeClr val="accent1">
+            <a:hueOff val="0"/>
+            <a:satOff val="0"/>
+            <a:lumOff val="0"/>
+            <a:alphaOff val="0"/>
+          </a:schemeClr>
+        </a:solidFill>
+        <a:ln w="15875" cap="flat" cmpd="sng" algn="ctr">
+          <a:solidFill>
+            <a:schemeClr val="lt1">
+              <a:hueOff val="0"/>
+              <a:satOff val="0"/>
+              <a:lumOff val="0"/>
+              <a:alphaOff val="0"/>
+            </a:schemeClr>
+          </a:solidFill>
+          <a:prstDash val="solid"/>
+        </a:ln>
+        <a:effectLst/>
+      </dsp:spPr>
+      <dsp:style>
+        <a:lnRef idx="2">
+          <a:scrgbClr r="0" g="0" b="0"/>
+        </a:lnRef>
+        <a:fillRef idx="1">
+          <a:scrgbClr r="0" g="0" b="0"/>
+        </a:fillRef>
+        <a:effectRef idx="0">
+          <a:scrgbClr r="0" g="0" b="0"/>
+        </a:effectRef>
+        <a:fontRef idx="minor">
+          <a:schemeClr val="lt1"/>
+        </a:fontRef>
+      </dsp:style>
+      <dsp:txBody>
+        <a:bodyPr spcFirstLastPara="0" vert="horz" wrap="square" lIns="41910" tIns="41910" rIns="41910" bIns="41910" numCol="1" spcCol="1270" anchor="ctr" anchorCtr="0">
+          <a:noAutofit/>
+        </a:bodyPr>
+        <a:lstStyle/>
+        <a:p>
+          <a:pPr marL="0" lvl="0" indent="0" algn="ctr" defTabSz="488950">
+            <a:lnSpc>
+              <a:spcPct val="90000"/>
+            </a:lnSpc>
+            <a:spcBef>
+              <a:spcPct val="0"/>
+            </a:spcBef>
+            <a:spcAft>
+              <a:spcPct val="35000"/>
+            </a:spcAft>
+            <a:buNone/>
+          </a:pPr>
+          <a:r>
+            <a:rPr lang="en-US" sz="1100" kern="1200" dirty="0"/>
+            <a:t>Export Requirements from </a:t>
+          </a:r>
+          <a:r>
+            <a:rPr lang="en-US" sz="1100" kern="1200" dirty="0" err="1"/>
+            <a:t>SyRS</a:t>
+          </a:r>
+          <a:r>
+            <a:rPr lang="en-US" sz="1100" kern="1200" dirty="0"/>
+            <a:t> </a:t>
+          </a:r>
+          <a:r>
+            <a:rPr lang="en-US" sz="1100" kern="1200"/>
+            <a:t>with links to URS</a:t>
+          </a:r>
+          <a:endParaRPr lang="en-US" sz="1100" kern="1200" dirty="0"/>
+        </a:p>
+      </dsp:txBody>
+      <dsp:txXfrm>
+        <a:off x="31015" y="2268266"/>
+        <a:ext cx="1506815" cy="882133"/>
+      </dsp:txXfrm>
+    </dsp:sp>
+    <dsp:sp modelId="{2C4F80CE-50C5-43C1-B9EA-9E8EA0A30832}">
+      <dsp:nvSpPr>
+        <dsp:cNvPr id="0" name=""/>
+        <dsp:cNvSpPr/>
+      </dsp:nvSpPr>
+      <dsp:spPr>
+        <a:xfrm>
+          <a:off x="1721445" y="2515682"/>
+          <a:ext cx="331081" cy="387302"/>
+        </a:xfrm>
+        <a:prstGeom prst="rightArrow">
+          <a:avLst>
+            <a:gd name="adj1" fmla="val 60000"/>
+            <a:gd name="adj2" fmla="val 50000"/>
+          </a:avLst>
+        </a:prstGeom>
+        <a:solidFill>
+          <a:schemeClr val="accent1">
+            <a:tint val="60000"/>
+            <a:hueOff val="0"/>
+            <a:satOff val="0"/>
+            <a:lumOff val="0"/>
+            <a:alphaOff val="0"/>
+          </a:schemeClr>
+        </a:solidFill>
+        <a:ln>
+          <a:noFill/>
+        </a:ln>
+        <a:effectLst/>
+      </dsp:spPr>
+      <dsp:style>
+        <a:lnRef idx="0">
+          <a:scrgbClr r="0" g="0" b="0"/>
+        </a:lnRef>
+        <a:fillRef idx="1">
+          <a:scrgbClr r="0" g="0" b="0"/>
+        </a:fillRef>
+        <a:effectRef idx="0">
+          <a:scrgbClr r="0" g="0" b="0"/>
+        </a:effectRef>
+        <a:fontRef idx="minor">
+          <a:schemeClr val="lt1"/>
+        </a:fontRef>
+      </dsp:style>
+      <dsp:txBody>
+        <a:bodyPr spcFirstLastPara="0" vert="horz" wrap="square" lIns="0" tIns="0" rIns="0" bIns="0" numCol="1" spcCol="1270" anchor="ctr" anchorCtr="0">
+          <a:noAutofit/>
+        </a:bodyPr>
+        <a:lstStyle/>
+        <a:p>
+          <a:pPr marL="0" lvl="0" indent="0" algn="ctr" defTabSz="400050">
+            <a:lnSpc>
+              <a:spcPct val="90000"/>
+            </a:lnSpc>
+            <a:spcBef>
+              <a:spcPct val="0"/>
+            </a:spcBef>
+            <a:spcAft>
+              <a:spcPct val="35000"/>
+            </a:spcAft>
+            <a:buNone/>
+          </a:pPr>
+          <a:endParaRPr lang="en-US" sz="900" kern="1200"/>
+        </a:p>
+      </dsp:txBody>
+      <dsp:txXfrm>
+        <a:off x="1721445" y="2593142"/>
+        <a:ext cx="231757" cy="232382"/>
+      </dsp:txXfrm>
+    </dsp:sp>
+    <dsp:sp modelId="{00E8D648-E404-4F01-817B-CCD37480E7AC}">
+      <dsp:nvSpPr>
+        <dsp:cNvPr id="0" name=""/>
+        <dsp:cNvSpPr/>
+      </dsp:nvSpPr>
+      <dsp:spPr>
+        <a:xfrm>
+          <a:off x="2189956" y="1938895"/>
+          <a:ext cx="1561703" cy="1540876"/>
+        </a:xfrm>
+        <a:prstGeom prst="roundRect">
+          <a:avLst>
+            <a:gd name="adj" fmla="val 10000"/>
+          </a:avLst>
+        </a:prstGeom>
+        <a:solidFill>
+          <a:schemeClr val="accent1">
+            <a:hueOff val="0"/>
+            <a:satOff val="0"/>
+            <a:lumOff val="0"/>
+            <a:alphaOff val="0"/>
+          </a:schemeClr>
+        </a:solidFill>
+        <a:ln w="15875" cap="flat" cmpd="sng" algn="ctr">
+          <a:solidFill>
+            <a:schemeClr val="lt1">
+              <a:hueOff val="0"/>
+              <a:satOff val="0"/>
+              <a:lumOff val="0"/>
+              <a:alphaOff val="0"/>
+            </a:schemeClr>
+          </a:solidFill>
+          <a:prstDash val="solid"/>
+        </a:ln>
+        <a:effectLst/>
+      </dsp:spPr>
+      <dsp:style>
+        <a:lnRef idx="2">
+          <a:scrgbClr r="0" g="0" b="0"/>
+        </a:lnRef>
+        <a:fillRef idx="1">
+          <a:scrgbClr r="0" g="0" b="0"/>
+        </a:fillRef>
+        <a:effectRef idx="0">
+          <a:scrgbClr r="0" g="0" b="0"/>
+        </a:effectRef>
+        <a:fontRef idx="minor">
+          <a:schemeClr val="lt1"/>
+        </a:fontRef>
+      </dsp:style>
+      <dsp:txBody>
+        <a:bodyPr spcFirstLastPara="0" vert="horz" wrap="square" lIns="41910" tIns="41910" rIns="41910" bIns="41910" numCol="1" spcCol="1270" anchor="ctr" anchorCtr="0">
+          <a:noAutofit/>
+        </a:bodyPr>
+        <a:lstStyle/>
+        <a:p>
+          <a:pPr marL="0" lvl="0" indent="0" algn="ctr" defTabSz="488950">
+            <a:lnSpc>
+              <a:spcPct val="90000"/>
+            </a:lnSpc>
+            <a:spcBef>
+              <a:spcPct val="0"/>
+            </a:spcBef>
+            <a:spcAft>
+              <a:spcPct val="35000"/>
+            </a:spcAft>
+            <a:buNone/>
+          </a:pPr>
+          <a:r>
+            <a:rPr lang="en-US" sz="1100" kern="1200" dirty="0"/>
+            <a:t>Run Tracer</a:t>
+          </a:r>
+          <a:br>
+            <a:rPr lang="en-US" sz="1100" kern="1200" dirty="0"/>
+          </a:br>
+          <a:br>
+            <a:rPr lang="en-US" sz="1100" kern="1200" dirty="0"/>
+          </a:br>
+          <a:r>
+            <a:rPr lang="en-US" sz="1100" kern="1200" dirty="0"/>
+            <a:t>Gen </a:t>
+          </a:r>
+          <a:r>
+            <a:rPr lang="en-US" sz="1100" kern="1200" dirty="0" err="1"/>
+            <a:t>URS→SyRS</a:t>
+          </a:r>
+          <a:r>
+            <a:rPr lang="en-US" sz="1100" kern="1200" dirty="0"/>
+            <a:t> concordance</a:t>
+          </a:r>
+        </a:p>
+      </dsp:txBody>
+      <dsp:txXfrm>
+        <a:off x="2235087" y="1984026"/>
+        <a:ext cx="1471441" cy="1450614"/>
+      </dsp:txXfrm>
+    </dsp:sp>
+    <dsp:sp modelId="{CE0C6F9C-E8B5-4074-90A0-9EF85FA94BAF}">
+      <dsp:nvSpPr>
+        <dsp:cNvPr id="0" name=""/>
+        <dsp:cNvSpPr/>
+      </dsp:nvSpPr>
+      <dsp:spPr>
+        <a:xfrm>
+          <a:off x="3907829" y="2515682"/>
+          <a:ext cx="331081" cy="387302"/>
+        </a:xfrm>
+        <a:prstGeom prst="rightArrow">
+          <a:avLst>
+            <a:gd name="adj1" fmla="val 60000"/>
+            <a:gd name="adj2" fmla="val 50000"/>
+          </a:avLst>
+        </a:prstGeom>
+        <a:solidFill>
+          <a:schemeClr val="accent1">
+            <a:tint val="60000"/>
+            <a:hueOff val="0"/>
+            <a:satOff val="0"/>
+            <a:lumOff val="0"/>
+            <a:alphaOff val="0"/>
+          </a:schemeClr>
+        </a:solidFill>
+        <a:ln>
+          <a:noFill/>
+        </a:ln>
+        <a:effectLst/>
+      </dsp:spPr>
+      <dsp:style>
+        <a:lnRef idx="0">
+          <a:scrgbClr r="0" g="0" b="0"/>
+        </a:lnRef>
+        <a:fillRef idx="1">
+          <a:scrgbClr r="0" g="0" b="0"/>
+        </a:fillRef>
+        <a:effectRef idx="0">
+          <a:scrgbClr r="0" g="0" b="0"/>
+        </a:effectRef>
+        <a:fontRef idx="minor">
+          <a:schemeClr val="lt1"/>
+        </a:fontRef>
+      </dsp:style>
+      <dsp:txBody>
+        <a:bodyPr spcFirstLastPara="0" vert="horz" wrap="square" lIns="0" tIns="0" rIns="0" bIns="0" numCol="1" spcCol="1270" anchor="ctr" anchorCtr="0">
+          <a:noAutofit/>
+        </a:bodyPr>
+        <a:lstStyle/>
+        <a:p>
+          <a:pPr marL="0" lvl="0" indent="0" algn="ctr" defTabSz="400050">
+            <a:lnSpc>
+              <a:spcPct val="90000"/>
+            </a:lnSpc>
+            <a:spcBef>
+              <a:spcPct val="0"/>
+            </a:spcBef>
+            <a:spcAft>
+              <a:spcPct val="35000"/>
+            </a:spcAft>
+            <a:buNone/>
+          </a:pPr>
+          <a:endParaRPr lang="en-US" sz="900" kern="1200"/>
+        </a:p>
+      </dsp:txBody>
+      <dsp:txXfrm>
+        <a:off x="3907829" y="2593142"/>
+        <a:ext cx="231757" cy="232382"/>
+      </dsp:txXfrm>
+    </dsp:sp>
+    <dsp:sp modelId="{F27E3628-B139-44D2-9764-152DFAC999E2}">
+      <dsp:nvSpPr>
+        <dsp:cNvPr id="0" name=""/>
+        <dsp:cNvSpPr/>
+      </dsp:nvSpPr>
+      <dsp:spPr>
+        <a:xfrm>
+          <a:off x="4376340" y="1919227"/>
+          <a:ext cx="1561703" cy="1580212"/>
+        </a:xfrm>
+        <a:prstGeom prst="roundRect">
+          <a:avLst>
+            <a:gd name="adj" fmla="val 10000"/>
+          </a:avLst>
+        </a:prstGeom>
+        <a:solidFill>
+          <a:schemeClr val="accent1">
+            <a:hueOff val="0"/>
+            <a:satOff val="0"/>
+            <a:lumOff val="0"/>
+            <a:alphaOff val="0"/>
+          </a:schemeClr>
+        </a:solidFill>
+        <a:ln w="15875" cap="flat" cmpd="sng" algn="ctr">
+          <a:solidFill>
+            <a:schemeClr val="lt1">
+              <a:hueOff val="0"/>
+              <a:satOff val="0"/>
+              <a:lumOff val="0"/>
+              <a:alphaOff val="0"/>
+            </a:schemeClr>
+          </a:solidFill>
+          <a:prstDash val="solid"/>
+        </a:ln>
+        <a:effectLst/>
+      </dsp:spPr>
+      <dsp:style>
+        <a:lnRef idx="2">
+          <a:scrgbClr r="0" g="0" b="0"/>
+        </a:lnRef>
+        <a:fillRef idx="1">
+          <a:scrgbClr r="0" g="0" b="0"/>
+        </a:fillRef>
+        <a:effectRef idx="0">
+          <a:scrgbClr r="0" g="0" b="0"/>
+        </a:effectRef>
+        <a:fontRef idx="minor">
+          <a:schemeClr val="lt1"/>
+        </a:fontRef>
+      </dsp:style>
+      <dsp:txBody>
+        <a:bodyPr spcFirstLastPara="0" vert="horz" wrap="square" lIns="41910" tIns="41910" rIns="41910" bIns="41910" numCol="1" spcCol="1270" anchor="ctr" anchorCtr="0">
+          <a:noAutofit/>
+        </a:bodyPr>
+        <a:lstStyle/>
+        <a:p>
+          <a:pPr marL="0" lvl="0" indent="0" algn="ctr" defTabSz="488950">
+            <a:lnSpc>
+              <a:spcPct val="90000"/>
+            </a:lnSpc>
+            <a:spcBef>
+              <a:spcPct val="0"/>
+            </a:spcBef>
+            <a:spcAft>
+              <a:spcPct val="35000"/>
+            </a:spcAft>
+            <a:buNone/>
+          </a:pPr>
+          <a:r>
+            <a:rPr lang="en-US" sz="1100" kern="1200" dirty="0"/>
+            <a:t>Run PythonTracer4</a:t>
+          </a:r>
+          <a:br>
+            <a:rPr lang="en-US" sz="1100" kern="1200" dirty="0"/>
+          </a:br>
+          <a:br>
+            <a:rPr lang="en-US" sz="1100" kern="1200" dirty="0"/>
+          </a:br>
+          <a:r>
+            <a:rPr lang="en-US" sz="1100" kern="1200" dirty="0"/>
+            <a:t>Split </a:t>
+          </a:r>
+          <a:r>
+            <a:rPr lang="en-US" sz="1100" kern="1200" dirty="0" err="1"/>
+            <a:t>URS→SyRS</a:t>
+          </a:r>
+          <a:r>
+            <a:rPr lang="en-US" sz="1100" kern="1200" dirty="0"/>
+            <a:t> split by </a:t>
+          </a:r>
+          <a:r>
+            <a:rPr lang="en-US" sz="1100" kern="1200" dirty="0" err="1"/>
+            <a:t>SyRS</a:t>
+          </a:r>
+          <a:endParaRPr lang="en-US" sz="1100" kern="1200" dirty="0"/>
+        </a:p>
+      </dsp:txBody>
+      <dsp:txXfrm>
+        <a:off x="4422081" y="1964968"/>
+        <a:ext cx="1470221" cy="1488730"/>
+      </dsp:txXfrm>
+    </dsp:sp>
+    <dsp:sp modelId="{0C33758C-79EC-4BE8-A1A8-22AAF0BE940E}">
+      <dsp:nvSpPr>
+        <dsp:cNvPr id="0" name=""/>
+        <dsp:cNvSpPr/>
+      </dsp:nvSpPr>
+      <dsp:spPr>
+        <a:xfrm>
+          <a:off x="6094214" y="2515682"/>
+          <a:ext cx="331081" cy="387302"/>
+        </a:xfrm>
+        <a:prstGeom prst="rightArrow">
+          <a:avLst>
+            <a:gd name="adj1" fmla="val 60000"/>
+            <a:gd name="adj2" fmla="val 50000"/>
+          </a:avLst>
+        </a:prstGeom>
+        <a:solidFill>
+          <a:schemeClr val="accent1">
+            <a:tint val="60000"/>
+            <a:hueOff val="0"/>
+            <a:satOff val="0"/>
+            <a:lumOff val="0"/>
+            <a:alphaOff val="0"/>
+          </a:schemeClr>
+        </a:solidFill>
+        <a:ln>
+          <a:noFill/>
+        </a:ln>
+        <a:effectLst/>
+      </dsp:spPr>
+      <dsp:style>
+        <a:lnRef idx="0">
+          <a:scrgbClr r="0" g="0" b="0"/>
+        </a:lnRef>
+        <a:fillRef idx="1">
+          <a:scrgbClr r="0" g="0" b="0"/>
+        </a:fillRef>
+        <a:effectRef idx="0">
+          <a:scrgbClr r="0" g="0" b="0"/>
+        </a:effectRef>
+        <a:fontRef idx="minor">
+          <a:schemeClr val="lt1"/>
+        </a:fontRef>
+      </dsp:style>
+      <dsp:txBody>
+        <a:bodyPr spcFirstLastPara="0" vert="horz" wrap="square" lIns="0" tIns="0" rIns="0" bIns="0" numCol="1" spcCol="1270" anchor="ctr" anchorCtr="0">
+          <a:noAutofit/>
+        </a:bodyPr>
+        <a:lstStyle/>
+        <a:p>
+          <a:pPr marL="0" lvl="0" indent="0" algn="ctr" defTabSz="400050">
+            <a:lnSpc>
+              <a:spcPct val="90000"/>
+            </a:lnSpc>
+            <a:spcBef>
+              <a:spcPct val="0"/>
+            </a:spcBef>
+            <a:spcAft>
+              <a:spcPct val="35000"/>
+            </a:spcAft>
+            <a:buNone/>
+          </a:pPr>
+          <a:endParaRPr lang="en-US" sz="900" kern="1200"/>
+        </a:p>
+      </dsp:txBody>
+      <dsp:txXfrm>
+        <a:off x="6094214" y="2593142"/>
+        <a:ext cx="231757" cy="232382"/>
+      </dsp:txXfrm>
+    </dsp:sp>
+    <dsp:sp modelId="{EEE0A0A3-0810-4336-B288-D5BE5803D451}">
+      <dsp:nvSpPr>
+        <dsp:cNvPr id="0" name=""/>
+        <dsp:cNvSpPr/>
+      </dsp:nvSpPr>
+      <dsp:spPr>
+        <a:xfrm>
+          <a:off x="6562724" y="1971681"/>
+          <a:ext cx="1561703" cy="1475303"/>
+        </a:xfrm>
+        <a:prstGeom prst="roundRect">
+          <a:avLst>
+            <a:gd name="adj" fmla="val 10000"/>
+          </a:avLst>
+        </a:prstGeom>
+        <a:solidFill>
+          <a:schemeClr val="accent1">
+            <a:hueOff val="0"/>
+            <a:satOff val="0"/>
+            <a:lumOff val="0"/>
+            <a:alphaOff val="0"/>
+          </a:schemeClr>
+        </a:solidFill>
+        <a:ln w="15875" cap="flat" cmpd="sng" algn="ctr">
+          <a:solidFill>
+            <a:schemeClr val="lt1">
+              <a:hueOff val="0"/>
+              <a:satOff val="0"/>
+              <a:lumOff val="0"/>
+              <a:alphaOff val="0"/>
+            </a:schemeClr>
+          </a:solidFill>
+          <a:prstDash val="solid"/>
+        </a:ln>
+        <a:effectLst/>
+      </dsp:spPr>
+      <dsp:style>
+        <a:lnRef idx="2">
+          <a:scrgbClr r="0" g="0" b="0"/>
+        </a:lnRef>
+        <a:fillRef idx="1">
+          <a:scrgbClr r="0" g="0" b="0"/>
+        </a:fillRef>
+        <a:effectRef idx="0">
+          <a:scrgbClr r="0" g="0" b="0"/>
+        </a:effectRef>
+        <a:fontRef idx="minor">
+          <a:schemeClr val="lt1"/>
+        </a:fontRef>
+      </dsp:style>
+      <dsp:txBody>
+        <a:bodyPr spcFirstLastPara="0" vert="horz" wrap="square" lIns="41910" tIns="41910" rIns="41910" bIns="41910" numCol="1" spcCol="1270" anchor="ctr" anchorCtr="0">
+          <a:noAutofit/>
+        </a:bodyPr>
+        <a:lstStyle/>
+        <a:p>
+          <a:pPr marL="0" lvl="0" indent="0" algn="ctr" defTabSz="488950">
+            <a:lnSpc>
+              <a:spcPct val="90000"/>
+            </a:lnSpc>
+            <a:spcBef>
+              <a:spcPct val="0"/>
+            </a:spcBef>
+            <a:spcAft>
+              <a:spcPct val="35000"/>
+            </a:spcAft>
+            <a:buNone/>
+          </a:pPr>
+          <a:r>
+            <a:rPr lang="en-US" sz="1100" kern="1200" dirty="0"/>
+            <a:t>Run </a:t>
+          </a:r>
+          <a:r>
+            <a:rPr lang="en-US" sz="1100" kern="1200" dirty="0" err="1"/>
+            <a:t>TraceReport</a:t>
+          </a:r>
+          <a:br>
+            <a:rPr lang="en-US" sz="1100" kern="1200" dirty="0"/>
+          </a:br>
+          <a:br>
+            <a:rPr lang="en-US" sz="1100" kern="1200" dirty="0"/>
+          </a:br>
+          <a:r>
+            <a:rPr lang="en-US" sz="1100" kern="1200" dirty="0"/>
+            <a:t>Generate </a:t>
+          </a:r>
+          <a:r>
+            <a:rPr lang="en-US" sz="1100" kern="1200" dirty="0" err="1"/>
+            <a:t>URS→SyRS→TestCase</a:t>
+          </a:r>
+          <a:endParaRPr lang="en-US" sz="1100" kern="1200" dirty="0"/>
+        </a:p>
+      </dsp:txBody>
+      <dsp:txXfrm>
+        <a:off x="6605934" y="2014891"/>
+        <a:ext cx="1475283" cy="1388883"/>
+      </dsp:txXfrm>
+    </dsp:sp>
+  </dsp:spTree>
+</dsp:drawing>
+</file>
+
 <file path=ppt/diagrams/layout1.xml><?xml version="1.0" encoding="utf-8"?>
 <dgm:layoutDef xmlns:dgm="http://schemas.openxmlformats.org/drawingml/2006/diagram" xmlns:a="http://schemas.openxmlformats.org/drawingml/2006/main" uniqueId="urn:microsoft.com/office/officeart/2005/8/layout/orgChart1">
   <dgm:title val=""/>
@@ -4638,7 +6324,1187 @@
 </dgm:layoutDef>
 </file>
 
+<file path=ppt/diagrams/layout2.xml><?xml version="1.0" encoding="utf-8"?>
+<dgm:layoutDef xmlns:dgm="http://schemas.openxmlformats.org/drawingml/2006/diagram" xmlns:a="http://schemas.openxmlformats.org/drawingml/2006/main" uniqueId="urn:microsoft.com/office/officeart/2005/8/layout/process1">
+  <dgm:title val=""/>
+  <dgm:desc val=""/>
+  <dgm:catLst>
+    <dgm:cat type="process" pri="1000"/>
+    <dgm:cat type="convert" pri="15000"/>
+  </dgm:catLst>
+  <dgm:sampData useDef="1">
+    <dgm:dataModel>
+      <dgm:ptLst/>
+      <dgm:bg/>
+      <dgm:whole/>
+    </dgm:dataModel>
+  </dgm:sampData>
+  <dgm:styleData>
+    <dgm:dataModel>
+      <dgm:ptLst>
+        <dgm:pt modelId="0" type="doc"/>
+        <dgm:pt modelId="1"/>
+        <dgm:pt modelId="2"/>
+      </dgm:ptLst>
+      <dgm:cxnLst>
+        <dgm:cxn modelId="3" srcId="0" destId="1" srcOrd="0" destOrd="0"/>
+        <dgm:cxn modelId="4" srcId="0" destId="2" srcOrd="1" destOrd="0"/>
+      </dgm:cxnLst>
+      <dgm:bg/>
+      <dgm:whole/>
+    </dgm:dataModel>
+  </dgm:styleData>
+  <dgm:clrData>
+    <dgm:dataModel>
+      <dgm:ptLst>
+        <dgm:pt modelId="0" type="doc"/>
+        <dgm:pt modelId="1"/>
+        <dgm:pt modelId="2"/>
+        <dgm:pt modelId="3"/>
+        <dgm:pt modelId="4"/>
+      </dgm:ptLst>
+      <dgm:cxnLst>
+        <dgm:cxn modelId="5" srcId="0" destId="1" srcOrd="0" destOrd="0"/>
+        <dgm:cxn modelId="6" srcId="0" destId="2" srcOrd="1" destOrd="0"/>
+        <dgm:cxn modelId="7" srcId="0" destId="3" srcOrd="2" destOrd="0"/>
+        <dgm:cxn modelId="8" srcId="0" destId="4" srcOrd="3" destOrd="0"/>
+      </dgm:cxnLst>
+      <dgm:bg/>
+      <dgm:whole/>
+    </dgm:dataModel>
+  </dgm:clrData>
+  <dgm:layoutNode name="Name0">
+    <dgm:varLst>
+      <dgm:dir/>
+      <dgm:resizeHandles val="exact"/>
+    </dgm:varLst>
+    <dgm:choose name="Name1">
+      <dgm:if name="Name2" func="var" arg="dir" op="equ" val="norm">
+        <dgm:alg type="lin"/>
+      </dgm:if>
+      <dgm:else name="Name3">
+        <dgm:alg type="lin">
+          <dgm:param type="linDir" val="fromR"/>
+        </dgm:alg>
+      </dgm:else>
+    </dgm:choose>
+    <dgm:shape xmlns:r="http://schemas.openxmlformats.org/officeDocument/2006/relationships" r:blip="">
+      <dgm:adjLst/>
+    </dgm:shape>
+    <dgm:presOf/>
+    <dgm:constrLst>
+      <dgm:constr type="w" for="ch" ptType="node" refType="w"/>
+      <dgm:constr type="h" for="ch" ptType="node" op="equ"/>
+      <dgm:constr type="primFontSz" for="ch" ptType="node" op="equ" val="65"/>
+      <dgm:constr type="w" for="ch" ptType="sibTrans" refType="w" refFor="ch" refPtType="node" op="equ" fact="0.4"/>
+      <dgm:constr type="h" for="ch" ptType="sibTrans" op="equ"/>
+      <dgm:constr type="primFontSz" for="des" forName="connectorText" op="equ" val="55"/>
+      <dgm:constr type="primFontSz" for="des" forName="connectorText" refType="primFontSz" refFor="ch" refPtType="node" op="lte" fact="0.8"/>
+    </dgm:constrLst>
+    <dgm:ruleLst/>
+    <dgm:forEach name="nodesForEach" axis="ch" ptType="node">
+      <dgm:layoutNode name="node">
+        <dgm:varLst>
+          <dgm:bulletEnabled val="1"/>
+        </dgm:varLst>
+        <dgm:alg type="tx"/>
+        <dgm:shape xmlns:r="http://schemas.openxmlformats.org/officeDocument/2006/relationships" type="roundRect" r:blip="">
+          <dgm:adjLst>
+            <dgm:adj idx="1" val="0.1"/>
+          </dgm:adjLst>
+        </dgm:shape>
+        <dgm:presOf axis="desOrSelf" ptType="node"/>
+        <dgm:constrLst>
+          <dgm:constr type="h" refType="w" fact="0.6"/>
+          <dgm:constr type="tMarg" refType="primFontSz" fact="0.3"/>
+          <dgm:constr type="bMarg" refType="primFontSz" fact="0.3"/>
+          <dgm:constr type="lMarg" refType="primFontSz" fact="0.3"/>
+          <dgm:constr type="rMarg" refType="primFontSz" fact="0.3"/>
+        </dgm:constrLst>
+        <dgm:ruleLst>
+          <dgm:rule type="primFontSz" val="18" fact="NaN" max="NaN"/>
+          <dgm:rule type="h" val="NaN" fact="1.5" max="NaN"/>
+          <dgm:rule type="primFontSz" val="5" fact="NaN" max="NaN"/>
+          <dgm:rule type="h" val="INF" fact="NaN" max="NaN"/>
+        </dgm:ruleLst>
+      </dgm:layoutNode>
+      <dgm:forEach name="sibTransForEach" axis="followSib" ptType="sibTrans" cnt="1">
+        <dgm:layoutNode name="sibTrans">
+          <dgm:alg type="conn">
+            <dgm:param type="begPts" val="auto"/>
+            <dgm:param type="endPts" val="auto"/>
+          </dgm:alg>
+          <dgm:shape xmlns:r="http://schemas.openxmlformats.org/officeDocument/2006/relationships" type="conn" r:blip="">
+            <dgm:adjLst/>
+          </dgm:shape>
+          <dgm:presOf axis="self"/>
+          <dgm:constrLst>
+            <dgm:constr type="h" refType="w" fact="0.62"/>
+            <dgm:constr type="connDist"/>
+            <dgm:constr type="begPad" refType="connDist" fact="0.25"/>
+            <dgm:constr type="endPad" refType="connDist" fact="0.22"/>
+          </dgm:constrLst>
+          <dgm:ruleLst/>
+          <dgm:layoutNode name="connectorText">
+            <dgm:alg type="tx">
+              <dgm:param type="autoTxRot" val="grav"/>
+            </dgm:alg>
+            <dgm:shape xmlns:r="http://schemas.openxmlformats.org/officeDocument/2006/relationships" type="conn" r:blip="" hideGeom="1">
+              <dgm:adjLst/>
+            </dgm:shape>
+            <dgm:presOf axis="self"/>
+            <dgm:constrLst>
+              <dgm:constr type="lMarg"/>
+              <dgm:constr type="rMarg"/>
+              <dgm:constr type="tMarg"/>
+              <dgm:constr type="bMarg"/>
+            </dgm:constrLst>
+            <dgm:ruleLst>
+              <dgm:rule type="primFontSz" val="5" fact="NaN" max="NaN"/>
+            </dgm:ruleLst>
+          </dgm:layoutNode>
+        </dgm:layoutNode>
+      </dgm:forEach>
+    </dgm:forEach>
+  </dgm:layoutNode>
+</dgm:layoutDef>
+</file>
+
 <file path=ppt/diagrams/quickStyle1.xml><?xml version="1.0" encoding="utf-8"?>
+<dgm:styleDef xmlns:dgm="http://schemas.openxmlformats.org/drawingml/2006/diagram" xmlns:a="http://schemas.openxmlformats.org/drawingml/2006/main" uniqueId="urn:microsoft.com/office/officeart/2005/8/quickstyle/simple1">
+  <dgm:title val=""/>
+  <dgm:desc val=""/>
+  <dgm:catLst>
+    <dgm:cat type="simple" pri="10100"/>
+  </dgm:catLst>
+  <dgm:scene3d>
+    <a:camera prst="orthographicFront"/>
+    <a:lightRig rig="threePt" dir="t"/>
+  </dgm:scene3d>
+  <dgm:styleLbl name="node0">
+    <dgm:scene3d>
+      <a:camera prst="orthographicFront"/>
+      <a:lightRig rig="threePt" dir="t"/>
+    </dgm:scene3d>
+    <dgm:sp3d/>
+    <dgm:txPr/>
+    <dgm:style>
+      <a:lnRef idx="2">
+        <a:scrgbClr r="0" g="0" b="0"/>
+      </a:lnRef>
+      <a:fillRef idx="1">
+        <a:scrgbClr r="0" g="0" b="0"/>
+      </a:fillRef>
+      <a:effectRef idx="0">
+        <a:scrgbClr r="0" g="0" b="0"/>
+      </a:effectRef>
+      <a:fontRef idx="minor">
+        <a:schemeClr val="lt1"/>
+      </a:fontRef>
+    </dgm:style>
+  </dgm:styleLbl>
+  <dgm:styleLbl name="lnNode1">
+    <dgm:scene3d>
+      <a:camera prst="orthographicFront"/>
+      <a:lightRig rig="threePt" dir="t"/>
+    </dgm:scene3d>
+    <dgm:sp3d/>
+    <dgm:txPr/>
+    <dgm:style>
+      <a:lnRef idx="2">
+        <a:scrgbClr r="0" g="0" b="0"/>
+      </a:lnRef>
+      <a:fillRef idx="1">
+        <a:scrgbClr r="0" g="0" b="0"/>
+      </a:fillRef>
+      <a:effectRef idx="0">
+        <a:scrgbClr r="0" g="0" b="0"/>
+      </a:effectRef>
+      <a:fontRef idx="minor">
+        <a:schemeClr val="lt1"/>
+      </a:fontRef>
+    </dgm:style>
+  </dgm:styleLbl>
+  <dgm:styleLbl name="vennNode1">
+    <dgm:scene3d>
+      <a:camera prst="orthographicFront"/>
+      <a:lightRig rig="threePt" dir="t"/>
+    </dgm:scene3d>
+    <dgm:sp3d/>
+    <dgm:txPr/>
+    <dgm:style>
+      <a:lnRef idx="2">
+        <a:scrgbClr r="0" g="0" b="0"/>
+      </a:lnRef>
+      <a:fillRef idx="1">
+        <a:scrgbClr r="0" g="0" b="0"/>
+      </a:fillRef>
+      <a:effectRef idx="0">
+        <a:scrgbClr r="0" g="0" b="0"/>
+      </a:effectRef>
+      <a:fontRef idx="minor">
+        <a:schemeClr val="tx1"/>
+      </a:fontRef>
+    </dgm:style>
+  </dgm:styleLbl>
+  <dgm:styleLbl name="alignNode1">
+    <dgm:scene3d>
+      <a:camera prst="orthographicFront"/>
+      <a:lightRig rig="threePt" dir="t"/>
+    </dgm:scene3d>
+    <dgm:sp3d/>
+    <dgm:txPr/>
+    <dgm:style>
+      <a:lnRef idx="2">
+        <a:scrgbClr r="0" g="0" b="0"/>
+      </a:lnRef>
+      <a:fillRef idx="1">
+        <a:scrgbClr r="0" g="0" b="0"/>
+      </a:fillRef>
+      <a:effectRef idx="0">
+        <a:scrgbClr r="0" g="0" b="0"/>
+      </a:effectRef>
+      <a:fontRef idx="minor">
+        <a:schemeClr val="lt1"/>
+      </a:fontRef>
+    </dgm:style>
+  </dgm:styleLbl>
+  <dgm:styleLbl name="node1">
+    <dgm:scene3d>
+      <a:camera prst="orthographicFront"/>
+      <a:lightRig rig="threePt" dir="t"/>
+    </dgm:scene3d>
+    <dgm:sp3d/>
+    <dgm:txPr/>
+    <dgm:style>
+      <a:lnRef idx="2">
+        <a:scrgbClr r="0" g="0" b="0"/>
+      </a:lnRef>
+      <a:fillRef idx="1">
+        <a:scrgbClr r="0" g="0" b="0"/>
+      </a:fillRef>
+      <a:effectRef idx="0">
+        <a:scrgbClr r="0" g="0" b="0"/>
+      </a:effectRef>
+      <a:fontRef idx="minor">
+        <a:schemeClr val="lt1"/>
+      </a:fontRef>
+    </dgm:style>
+  </dgm:styleLbl>
+  <dgm:styleLbl name="node2">
+    <dgm:scene3d>
+      <a:camera prst="orthographicFront"/>
+      <a:lightRig rig="threePt" dir="t"/>
+    </dgm:scene3d>
+    <dgm:sp3d/>
+    <dgm:txPr/>
+    <dgm:style>
+      <a:lnRef idx="2">
+        <a:scrgbClr r="0" g="0" b="0"/>
+      </a:lnRef>
+      <a:fillRef idx="1">
+        <a:scrgbClr r="0" g="0" b="0"/>
+      </a:fillRef>
+      <a:effectRef idx="0">
+        <a:scrgbClr r="0" g="0" b="0"/>
+      </a:effectRef>
+      <a:fontRef idx="minor">
+        <a:schemeClr val="lt1"/>
+      </a:fontRef>
+    </dgm:style>
+  </dgm:styleLbl>
+  <dgm:styleLbl name="node3">
+    <dgm:scene3d>
+      <a:camera prst="orthographicFront"/>
+      <a:lightRig rig="threePt" dir="t"/>
+    </dgm:scene3d>
+    <dgm:sp3d/>
+    <dgm:txPr/>
+    <dgm:style>
+      <a:lnRef idx="2">
+        <a:scrgbClr r="0" g="0" b="0"/>
+      </a:lnRef>
+      <a:fillRef idx="1">
+        <a:scrgbClr r="0" g="0" b="0"/>
+      </a:fillRef>
+      <a:effectRef idx="0">
+        <a:scrgbClr r="0" g="0" b="0"/>
+      </a:effectRef>
+      <a:fontRef idx="minor">
+        <a:schemeClr val="lt1"/>
+      </a:fontRef>
+    </dgm:style>
+  </dgm:styleLbl>
+  <dgm:styleLbl name="node4">
+    <dgm:scene3d>
+      <a:camera prst="orthographicFront"/>
+      <a:lightRig rig="threePt" dir="t"/>
+    </dgm:scene3d>
+    <dgm:sp3d/>
+    <dgm:txPr/>
+    <dgm:style>
+      <a:lnRef idx="2">
+        <a:scrgbClr r="0" g="0" b="0"/>
+      </a:lnRef>
+      <a:fillRef idx="1">
+        <a:scrgbClr r="0" g="0" b="0"/>
+      </a:fillRef>
+      <a:effectRef idx="0">
+        <a:scrgbClr r="0" g="0" b="0"/>
+      </a:effectRef>
+      <a:fontRef idx="minor">
+        <a:schemeClr val="lt1"/>
+      </a:fontRef>
+    </dgm:style>
+  </dgm:styleLbl>
+  <dgm:styleLbl name="fgImgPlace1">
+    <dgm:scene3d>
+      <a:camera prst="orthographicFront"/>
+      <a:lightRig rig="threePt" dir="t"/>
+    </dgm:scene3d>
+    <dgm:sp3d/>
+    <dgm:txPr/>
+    <dgm:style>
+      <a:lnRef idx="2">
+        <a:scrgbClr r="0" g="0" b="0"/>
+      </a:lnRef>
+      <a:fillRef idx="1">
+        <a:scrgbClr r="0" g="0" b="0"/>
+      </a:fillRef>
+      <a:effectRef idx="0">
+        <a:scrgbClr r="0" g="0" b="0"/>
+      </a:effectRef>
+      <a:fontRef idx="minor"/>
+    </dgm:style>
+  </dgm:styleLbl>
+  <dgm:styleLbl name="alignImgPlace1">
+    <dgm:scene3d>
+      <a:camera prst="orthographicFront"/>
+      <a:lightRig rig="threePt" dir="t"/>
+    </dgm:scene3d>
+    <dgm:sp3d/>
+    <dgm:txPr/>
+    <dgm:style>
+      <a:lnRef idx="2">
+        <a:scrgbClr r="0" g="0" b="0"/>
+      </a:lnRef>
+      <a:fillRef idx="1">
+        <a:scrgbClr r="0" g="0" b="0"/>
+      </a:fillRef>
+      <a:effectRef idx="0">
+        <a:scrgbClr r="0" g="0" b="0"/>
+      </a:effectRef>
+      <a:fontRef idx="minor"/>
+    </dgm:style>
+  </dgm:styleLbl>
+  <dgm:styleLbl name="bgImgPlace1">
+    <dgm:scene3d>
+      <a:camera prst="orthographicFront"/>
+      <a:lightRig rig="threePt" dir="t"/>
+    </dgm:scene3d>
+    <dgm:sp3d/>
+    <dgm:txPr/>
+    <dgm:style>
+      <a:lnRef idx="2">
+        <a:scrgbClr r="0" g="0" b="0"/>
+      </a:lnRef>
+      <a:fillRef idx="1">
+        <a:scrgbClr r="0" g="0" b="0"/>
+      </a:fillRef>
+      <a:effectRef idx="0">
+        <a:scrgbClr r="0" g="0" b="0"/>
+      </a:effectRef>
+      <a:fontRef idx="minor"/>
+    </dgm:style>
+  </dgm:styleLbl>
+  <dgm:styleLbl name="sibTrans2D1">
+    <dgm:scene3d>
+      <a:camera prst="orthographicFront"/>
+      <a:lightRig rig="threePt" dir="t"/>
+    </dgm:scene3d>
+    <dgm:sp3d/>
+    <dgm:txPr/>
+    <dgm:style>
+      <a:lnRef idx="0">
+        <a:scrgbClr r="0" g="0" b="0"/>
+      </a:lnRef>
+      <a:fillRef idx="1">
+        <a:scrgbClr r="0" g="0" b="0"/>
+      </a:fillRef>
+      <a:effectRef idx="0">
+        <a:scrgbClr r="0" g="0" b="0"/>
+      </a:effectRef>
+      <a:fontRef idx="minor">
+        <a:schemeClr val="lt1"/>
+      </a:fontRef>
+    </dgm:style>
+  </dgm:styleLbl>
+  <dgm:styleLbl name="fgSibTrans2D1">
+    <dgm:scene3d>
+      <a:camera prst="orthographicFront"/>
+      <a:lightRig rig="threePt" dir="t"/>
+    </dgm:scene3d>
+    <dgm:sp3d/>
+    <dgm:txPr/>
+    <dgm:style>
+      <a:lnRef idx="0">
+        <a:scrgbClr r="0" g="0" b="0"/>
+      </a:lnRef>
+      <a:fillRef idx="1">
+        <a:scrgbClr r="0" g="0" b="0"/>
+      </a:fillRef>
+      <a:effectRef idx="0">
+        <a:scrgbClr r="0" g="0" b="0"/>
+      </a:effectRef>
+      <a:fontRef idx="minor">
+        <a:schemeClr val="lt1"/>
+      </a:fontRef>
+    </dgm:style>
+  </dgm:styleLbl>
+  <dgm:styleLbl name="bgSibTrans2D1">
+    <dgm:scene3d>
+      <a:camera prst="orthographicFront"/>
+      <a:lightRig rig="threePt" dir="t"/>
+    </dgm:scene3d>
+    <dgm:sp3d/>
+    <dgm:txPr/>
+    <dgm:style>
+      <a:lnRef idx="0">
+        <a:scrgbClr r="0" g="0" b="0"/>
+      </a:lnRef>
+      <a:fillRef idx="1">
+        <a:scrgbClr r="0" g="0" b="0"/>
+      </a:fillRef>
+      <a:effectRef idx="0">
+        <a:scrgbClr r="0" g="0" b="0"/>
+      </a:effectRef>
+      <a:fontRef idx="minor">
+        <a:schemeClr val="lt1"/>
+      </a:fontRef>
+    </dgm:style>
+  </dgm:styleLbl>
+  <dgm:styleLbl name="sibTrans1D1">
+    <dgm:scene3d>
+      <a:camera prst="orthographicFront"/>
+      <a:lightRig rig="threePt" dir="t"/>
+    </dgm:scene3d>
+    <dgm:sp3d/>
+    <dgm:txPr/>
+    <dgm:style>
+      <a:lnRef idx="1">
+        <a:scrgbClr r="0" g="0" b="0"/>
+      </a:lnRef>
+      <a:fillRef idx="0">
+        <a:scrgbClr r="0" g="0" b="0"/>
+      </a:fillRef>
+      <a:effectRef idx="0">
+        <a:scrgbClr r="0" g="0" b="0"/>
+      </a:effectRef>
+      <a:fontRef idx="minor"/>
+    </dgm:style>
+  </dgm:styleLbl>
+  <dgm:styleLbl name="callout">
+    <dgm:scene3d>
+      <a:camera prst="orthographicFront"/>
+      <a:lightRig rig="threePt" dir="t"/>
+    </dgm:scene3d>
+    <dgm:sp3d/>
+    <dgm:txPr/>
+    <dgm:style>
+      <a:lnRef idx="2">
+        <a:scrgbClr r="0" g="0" b="0"/>
+      </a:lnRef>
+      <a:fillRef idx="1">
+        <a:scrgbClr r="0" g="0" b="0"/>
+      </a:fillRef>
+      <a:effectRef idx="0">
+        <a:scrgbClr r="0" g="0" b="0"/>
+      </a:effectRef>
+      <a:fontRef idx="minor"/>
+    </dgm:style>
+  </dgm:styleLbl>
+  <dgm:styleLbl name="asst0">
+    <dgm:scene3d>
+      <a:camera prst="orthographicFront"/>
+      <a:lightRig rig="threePt" dir="t"/>
+    </dgm:scene3d>
+    <dgm:sp3d/>
+    <dgm:txPr/>
+    <dgm:style>
+      <a:lnRef idx="2">
+        <a:scrgbClr r="0" g="0" b="0"/>
+      </a:lnRef>
+      <a:fillRef idx="1">
+        <a:scrgbClr r="0" g="0" b="0"/>
+      </a:fillRef>
+      <a:effectRef idx="0">
+        <a:scrgbClr r="0" g="0" b="0"/>
+      </a:effectRef>
+      <a:fontRef idx="minor">
+        <a:schemeClr val="lt1"/>
+      </a:fontRef>
+    </dgm:style>
+  </dgm:styleLbl>
+  <dgm:styleLbl name="asst1">
+    <dgm:scene3d>
+      <a:camera prst="orthographicFront"/>
+      <a:lightRig rig="threePt" dir="t"/>
+    </dgm:scene3d>
+    <dgm:sp3d/>
+    <dgm:txPr/>
+    <dgm:style>
+      <a:lnRef idx="2">
+        <a:scrgbClr r="0" g="0" b="0"/>
+      </a:lnRef>
+      <a:fillRef idx="1">
+        <a:scrgbClr r="0" g="0" b="0"/>
+      </a:fillRef>
+      <a:effectRef idx="0">
+        <a:scrgbClr r="0" g="0" b="0"/>
+      </a:effectRef>
+      <a:fontRef idx="minor">
+        <a:schemeClr val="lt1"/>
+      </a:fontRef>
+    </dgm:style>
+  </dgm:styleLbl>
+  <dgm:styleLbl name="asst2">
+    <dgm:scene3d>
+      <a:camera prst="orthographicFront"/>
+      <a:lightRig rig="threePt" dir="t"/>
+    </dgm:scene3d>
+    <dgm:sp3d/>
+    <dgm:txPr/>
+    <dgm:style>
+      <a:lnRef idx="2">
+        <a:scrgbClr r="0" g="0" b="0"/>
+      </a:lnRef>
+      <a:fillRef idx="1">
+        <a:scrgbClr r="0" g="0" b="0"/>
+      </a:fillRef>
+      <a:effectRef idx="0">
+        <a:scrgbClr r="0" g="0" b="0"/>
+      </a:effectRef>
+      <a:fontRef idx="minor">
+        <a:schemeClr val="lt1"/>
+      </a:fontRef>
+    </dgm:style>
+  </dgm:styleLbl>
+  <dgm:styleLbl name="asst3">
+    <dgm:scene3d>
+      <a:camera prst="orthographicFront"/>
+      <a:lightRig rig="threePt" dir="t"/>
+    </dgm:scene3d>
+    <dgm:sp3d/>
+    <dgm:txPr/>
+    <dgm:style>
+      <a:lnRef idx="2">
+        <a:scrgbClr r="0" g="0" b="0"/>
+      </a:lnRef>
+      <a:fillRef idx="1">
+        <a:scrgbClr r="0" g="0" b="0"/>
+      </a:fillRef>
+      <a:effectRef idx="0">
+        <a:scrgbClr r="0" g="0" b="0"/>
+      </a:effectRef>
+      <a:fontRef idx="minor">
+        <a:schemeClr val="lt1"/>
+      </a:fontRef>
+    </dgm:style>
+  </dgm:styleLbl>
+  <dgm:styleLbl name="asst4">
+    <dgm:scene3d>
+      <a:camera prst="orthographicFront"/>
+      <a:lightRig rig="threePt" dir="t"/>
+    </dgm:scene3d>
+    <dgm:sp3d/>
+    <dgm:txPr/>
+    <dgm:style>
+      <a:lnRef idx="2">
+        <a:scrgbClr r="0" g="0" b="0"/>
+      </a:lnRef>
+      <a:fillRef idx="1">
+        <a:scrgbClr r="0" g="0" b="0"/>
+      </a:fillRef>
+      <a:effectRef idx="0">
+        <a:scrgbClr r="0" g="0" b="0"/>
+      </a:effectRef>
+      <a:fontRef idx="minor">
+        <a:schemeClr val="lt1"/>
+      </a:fontRef>
+    </dgm:style>
+  </dgm:styleLbl>
+  <dgm:styleLbl name="parChTrans2D1">
+    <dgm:scene3d>
+      <a:camera prst="orthographicFront"/>
+      <a:lightRig rig="threePt" dir="t"/>
+    </dgm:scene3d>
+    <dgm:sp3d/>
+    <dgm:txPr/>
+    <dgm:style>
+      <a:lnRef idx="2">
+        <a:scrgbClr r="0" g="0" b="0"/>
+      </a:lnRef>
+      <a:fillRef idx="1">
+        <a:scrgbClr r="0" g="0" b="0"/>
+      </a:fillRef>
+      <a:effectRef idx="0">
+        <a:scrgbClr r="0" g="0" b="0"/>
+      </a:effectRef>
+      <a:fontRef idx="minor">
+        <a:schemeClr val="lt1"/>
+      </a:fontRef>
+    </dgm:style>
+  </dgm:styleLbl>
+  <dgm:styleLbl name="parChTrans2D2">
+    <dgm:scene3d>
+      <a:camera prst="orthographicFront"/>
+      <a:lightRig rig="threePt" dir="t"/>
+    </dgm:scene3d>
+    <dgm:sp3d/>
+    <dgm:txPr/>
+    <dgm:style>
+      <a:lnRef idx="2">
+        <a:scrgbClr r="0" g="0" b="0"/>
+      </a:lnRef>
+      <a:fillRef idx="1">
+        <a:scrgbClr r="0" g="0" b="0"/>
+      </a:fillRef>
+      <a:effectRef idx="0">
+        <a:scrgbClr r="0" g="0" b="0"/>
+      </a:effectRef>
+      <a:fontRef idx="minor">
+        <a:schemeClr val="lt1"/>
+      </a:fontRef>
+    </dgm:style>
+  </dgm:styleLbl>
+  <dgm:styleLbl name="parChTrans2D3">
+    <dgm:scene3d>
+      <a:camera prst="orthographicFront"/>
+      <a:lightRig rig="threePt" dir="t"/>
+    </dgm:scene3d>
+    <dgm:sp3d/>
+    <dgm:txPr/>
+    <dgm:style>
+      <a:lnRef idx="2">
+        <a:scrgbClr r="0" g="0" b="0"/>
+      </a:lnRef>
+      <a:fillRef idx="1">
+        <a:scrgbClr r="0" g="0" b="0"/>
+      </a:fillRef>
+      <a:effectRef idx="0">
+        <a:scrgbClr r="0" g="0" b="0"/>
+      </a:effectRef>
+      <a:fontRef idx="minor">
+        <a:schemeClr val="lt1"/>
+      </a:fontRef>
+    </dgm:style>
+  </dgm:styleLbl>
+  <dgm:styleLbl name="parChTrans2D4">
+    <dgm:scene3d>
+      <a:camera prst="orthographicFront"/>
+      <a:lightRig rig="threePt" dir="t"/>
+    </dgm:scene3d>
+    <dgm:sp3d/>
+    <dgm:txPr/>
+    <dgm:style>
+      <a:lnRef idx="2">
+        <a:scrgbClr r="0" g="0" b="0"/>
+      </a:lnRef>
+      <a:fillRef idx="1">
+        <a:scrgbClr r="0" g="0" b="0"/>
+      </a:fillRef>
+      <a:effectRef idx="0">
+        <a:scrgbClr r="0" g="0" b="0"/>
+      </a:effectRef>
+      <a:fontRef idx="minor">
+        <a:schemeClr val="lt1"/>
+      </a:fontRef>
+    </dgm:style>
+  </dgm:styleLbl>
+  <dgm:styleLbl name="parChTrans1D1">
+    <dgm:scene3d>
+      <a:camera prst="orthographicFront"/>
+      <a:lightRig rig="threePt" dir="t"/>
+    </dgm:scene3d>
+    <dgm:sp3d/>
+    <dgm:txPr/>
+    <dgm:style>
+      <a:lnRef idx="2">
+        <a:scrgbClr r="0" g="0" b="0"/>
+      </a:lnRef>
+      <a:fillRef idx="0">
+        <a:scrgbClr r="0" g="0" b="0"/>
+      </a:fillRef>
+      <a:effectRef idx="0">
+        <a:scrgbClr r="0" g="0" b="0"/>
+      </a:effectRef>
+      <a:fontRef idx="minor"/>
+    </dgm:style>
+  </dgm:styleLbl>
+  <dgm:styleLbl name="parChTrans1D2">
+    <dgm:scene3d>
+      <a:camera prst="orthographicFront"/>
+      <a:lightRig rig="threePt" dir="t"/>
+    </dgm:scene3d>
+    <dgm:sp3d/>
+    <dgm:txPr/>
+    <dgm:style>
+      <a:lnRef idx="2">
+        <a:scrgbClr r="0" g="0" b="0"/>
+      </a:lnRef>
+      <a:fillRef idx="0">
+        <a:scrgbClr r="0" g="0" b="0"/>
+      </a:fillRef>
+      <a:effectRef idx="0">
+        <a:scrgbClr r="0" g="0" b="0"/>
+      </a:effectRef>
+      <a:fontRef idx="minor"/>
+    </dgm:style>
+  </dgm:styleLbl>
+  <dgm:styleLbl name="parChTrans1D3">
+    <dgm:scene3d>
+      <a:camera prst="orthographicFront"/>
+      <a:lightRig rig="threePt" dir="t"/>
+    </dgm:scene3d>
+    <dgm:sp3d/>
+    <dgm:txPr/>
+    <dgm:style>
+      <a:lnRef idx="2">
+        <a:scrgbClr r="0" g="0" b="0"/>
+      </a:lnRef>
+      <a:fillRef idx="0">
+        <a:scrgbClr r="0" g="0" b="0"/>
+      </a:fillRef>
+      <a:effectRef idx="0">
+        <a:scrgbClr r="0" g="0" b="0"/>
+      </a:effectRef>
+      <a:fontRef idx="minor"/>
+    </dgm:style>
+  </dgm:styleLbl>
+  <dgm:styleLbl name="parChTrans1D4">
+    <dgm:scene3d>
+      <a:camera prst="orthographicFront"/>
+      <a:lightRig rig="threePt" dir="t"/>
+    </dgm:scene3d>
+    <dgm:sp3d/>
+    <dgm:txPr/>
+    <dgm:style>
+      <a:lnRef idx="2">
+        <a:scrgbClr r="0" g="0" b="0"/>
+      </a:lnRef>
+      <a:fillRef idx="0">
+        <a:scrgbClr r="0" g="0" b="0"/>
+      </a:fillRef>
+      <a:effectRef idx="0">
+        <a:scrgbClr r="0" g="0" b="0"/>
+      </a:effectRef>
+      <a:fontRef idx="minor"/>
+    </dgm:style>
+  </dgm:styleLbl>
+  <dgm:styleLbl name="fgAcc1">
+    <dgm:scene3d>
+      <a:camera prst="orthographicFront"/>
+      <a:lightRig rig="threePt" dir="t"/>
+    </dgm:scene3d>
+    <dgm:sp3d/>
+    <dgm:txPr/>
+    <dgm:style>
+      <a:lnRef idx="2">
+        <a:scrgbClr r="0" g="0" b="0"/>
+      </a:lnRef>
+      <a:fillRef idx="1">
+        <a:scrgbClr r="0" g="0" b="0"/>
+      </a:fillRef>
+      <a:effectRef idx="0">
+        <a:scrgbClr r="0" g="0" b="0"/>
+      </a:effectRef>
+      <a:fontRef idx="minor"/>
+    </dgm:style>
+  </dgm:styleLbl>
+  <dgm:styleLbl name="conFgAcc1">
+    <dgm:scene3d>
+      <a:camera prst="orthographicFront"/>
+      <a:lightRig rig="threePt" dir="t"/>
+    </dgm:scene3d>
+    <dgm:sp3d/>
+    <dgm:txPr/>
+    <dgm:style>
+      <a:lnRef idx="2">
+        <a:scrgbClr r="0" g="0" b="0"/>
+      </a:lnRef>
+      <a:fillRef idx="1">
+        <a:scrgbClr r="0" g="0" b="0"/>
+      </a:fillRef>
+      <a:effectRef idx="0">
+        <a:scrgbClr r="0" g="0" b="0"/>
+      </a:effectRef>
+      <a:fontRef idx="minor"/>
+    </dgm:style>
+  </dgm:styleLbl>
+  <dgm:styleLbl name="alignAcc1">
+    <dgm:scene3d>
+      <a:camera prst="orthographicFront"/>
+      <a:lightRig rig="threePt" dir="t"/>
+    </dgm:scene3d>
+    <dgm:sp3d/>
+    <dgm:txPr/>
+    <dgm:style>
+      <a:lnRef idx="2">
+        <a:scrgbClr r="0" g="0" b="0"/>
+      </a:lnRef>
+      <a:fillRef idx="1">
+        <a:scrgbClr r="0" g="0" b="0"/>
+      </a:fillRef>
+      <a:effectRef idx="0">
+        <a:scrgbClr r="0" g="0" b="0"/>
+      </a:effectRef>
+      <a:fontRef idx="minor"/>
+    </dgm:style>
+  </dgm:styleLbl>
+  <dgm:styleLbl name="trAlignAcc1">
+    <dgm:scene3d>
+      <a:camera prst="orthographicFront"/>
+      <a:lightRig rig="threePt" dir="t"/>
+    </dgm:scene3d>
+    <dgm:sp3d/>
+    <dgm:txPr/>
+    <dgm:style>
+      <a:lnRef idx="1">
+        <a:scrgbClr r="0" g="0" b="0"/>
+      </a:lnRef>
+      <a:fillRef idx="1">
+        <a:scrgbClr r="0" g="0" b="0"/>
+      </a:fillRef>
+      <a:effectRef idx="0">
+        <a:scrgbClr r="0" g="0" b="0"/>
+      </a:effectRef>
+      <a:fontRef idx="minor"/>
+    </dgm:style>
+  </dgm:styleLbl>
+  <dgm:styleLbl name="bgAcc1">
+    <dgm:scene3d>
+      <a:camera prst="orthographicFront"/>
+      <a:lightRig rig="threePt" dir="t"/>
+    </dgm:scene3d>
+    <dgm:sp3d/>
+    <dgm:txPr/>
+    <dgm:style>
+      <a:lnRef idx="2">
+        <a:scrgbClr r="0" g="0" b="0"/>
+      </a:lnRef>
+      <a:fillRef idx="1">
+        <a:scrgbClr r="0" g="0" b="0"/>
+      </a:fillRef>
+      <a:effectRef idx="0">
+        <a:scrgbClr r="0" g="0" b="0"/>
+      </a:effectRef>
+      <a:fontRef idx="minor"/>
+    </dgm:style>
+  </dgm:styleLbl>
+  <dgm:styleLbl name="solidFgAcc1">
+    <dgm:scene3d>
+      <a:camera prst="orthographicFront"/>
+      <a:lightRig rig="threePt" dir="t"/>
+    </dgm:scene3d>
+    <dgm:sp3d/>
+    <dgm:txPr/>
+    <dgm:style>
+      <a:lnRef idx="2">
+        <a:scrgbClr r="0" g="0" b="0"/>
+      </a:lnRef>
+      <a:fillRef idx="1">
+        <a:scrgbClr r="0" g="0" b="0"/>
+      </a:fillRef>
+      <a:effectRef idx="0">
+        <a:scrgbClr r="0" g="0" b="0"/>
+      </a:effectRef>
+      <a:fontRef idx="minor"/>
+    </dgm:style>
+  </dgm:styleLbl>
+  <dgm:styleLbl name="solidAlignAcc1">
+    <dgm:scene3d>
+      <a:camera prst="orthographicFront"/>
+      <a:lightRig rig="threePt" dir="t"/>
+    </dgm:scene3d>
+    <dgm:sp3d/>
+    <dgm:txPr/>
+    <dgm:style>
+      <a:lnRef idx="2">
+        <a:scrgbClr r="0" g="0" b="0"/>
+      </a:lnRef>
+      <a:fillRef idx="1">
+        <a:scrgbClr r="0" g="0" b="0"/>
+      </a:fillRef>
+      <a:effectRef idx="0">
+        <a:scrgbClr r="0" g="0" b="0"/>
+      </a:effectRef>
+      <a:fontRef idx="minor"/>
+    </dgm:style>
+  </dgm:styleLbl>
+  <dgm:styleLbl name="solidBgAcc1">
+    <dgm:scene3d>
+      <a:camera prst="orthographicFront"/>
+      <a:lightRig rig="threePt" dir="t"/>
+    </dgm:scene3d>
+    <dgm:sp3d/>
+    <dgm:txPr/>
+    <dgm:style>
+      <a:lnRef idx="2">
+        <a:scrgbClr r="0" g="0" b="0"/>
+      </a:lnRef>
+      <a:fillRef idx="1">
+        <a:scrgbClr r="0" g="0" b="0"/>
+      </a:fillRef>
+      <a:effectRef idx="0">
+        <a:scrgbClr r="0" g="0" b="0"/>
+      </a:effectRef>
+      <a:fontRef idx="minor"/>
+    </dgm:style>
+  </dgm:styleLbl>
+  <dgm:styleLbl name="fgAccFollowNode1">
+    <dgm:scene3d>
+      <a:camera prst="orthographicFront"/>
+      <a:lightRig rig="threePt" dir="t"/>
+    </dgm:scene3d>
+    <dgm:sp3d/>
+    <dgm:txPr/>
+    <dgm:style>
+      <a:lnRef idx="2">
+        <a:scrgbClr r="0" g="0" b="0"/>
+      </a:lnRef>
+      <a:fillRef idx="1">
+        <a:scrgbClr r="0" g="0" b="0"/>
+      </a:fillRef>
+      <a:effectRef idx="0">
+        <a:scrgbClr r="0" g="0" b="0"/>
+      </a:effectRef>
+      <a:fontRef idx="minor"/>
+    </dgm:style>
+  </dgm:styleLbl>
+  <dgm:styleLbl name="alignAccFollowNode1">
+    <dgm:scene3d>
+      <a:camera prst="orthographicFront"/>
+      <a:lightRig rig="threePt" dir="t"/>
+    </dgm:scene3d>
+    <dgm:sp3d/>
+    <dgm:txPr/>
+    <dgm:style>
+      <a:lnRef idx="2">
+        <a:scrgbClr r="0" g="0" b="0"/>
+      </a:lnRef>
+      <a:fillRef idx="1">
+        <a:scrgbClr r="0" g="0" b="0"/>
+      </a:fillRef>
+      <a:effectRef idx="0">
+        <a:scrgbClr r="0" g="0" b="0"/>
+      </a:effectRef>
+      <a:fontRef idx="minor"/>
+    </dgm:style>
+  </dgm:styleLbl>
+  <dgm:styleLbl name="bgAccFollowNode1">
+    <dgm:scene3d>
+      <a:camera prst="orthographicFront"/>
+      <a:lightRig rig="threePt" dir="t"/>
+    </dgm:scene3d>
+    <dgm:sp3d/>
+    <dgm:txPr/>
+    <dgm:style>
+      <a:lnRef idx="2">
+        <a:scrgbClr r="0" g="0" b="0"/>
+      </a:lnRef>
+      <a:fillRef idx="1">
+        <a:scrgbClr r="0" g="0" b="0"/>
+      </a:fillRef>
+      <a:effectRef idx="0">
+        <a:scrgbClr r="0" g="0" b="0"/>
+      </a:effectRef>
+      <a:fontRef idx="minor"/>
+    </dgm:style>
+  </dgm:styleLbl>
+  <dgm:styleLbl name="fgAcc0">
+    <dgm:scene3d>
+      <a:camera prst="orthographicFront"/>
+      <a:lightRig rig="threePt" dir="t"/>
+    </dgm:scene3d>
+    <dgm:sp3d/>
+    <dgm:txPr/>
+    <dgm:style>
+      <a:lnRef idx="2">
+        <a:scrgbClr r="0" g="0" b="0"/>
+      </a:lnRef>
+      <a:fillRef idx="1">
+        <a:scrgbClr r="0" g="0" b="0"/>
+      </a:fillRef>
+      <a:effectRef idx="0">
+        <a:scrgbClr r="0" g="0" b="0"/>
+      </a:effectRef>
+      <a:fontRef idx="minor"/>
+    </dgm:style>
+  </dgm:styleLbl>
+  <dgm:styleLbl name="fgAcc2">
+    <dgm:scene3d>
+      <a:camera prst="orthographicFront"/>
+      <a:lightRig rig="threePt" dir="t"/>
+    </dgm:scene3d>
+    <dgm:sp3d/>
+    <dgm:txPr/>
+    <dgm:style>
+      <a:lnRef idx="2">
+        <a:scrgbClr r="0" g="0" b="0"/>
+      </a:lnRef>
+      <a:fillRef idx="1">
+        <a:scrgbClr r="0" g="0" b="0"/>
+      </a:fillRef>
+      <a:effectRef idx="0">
+        <a:scrgbClr r="0" g="0" b="0"/>
+      </a:effectRef>
+      <a:fontRef idx="minor"/>
+    </dgm:style>
+  </dgm:styleLbl>
+  <dgm:styleLbl name="fgAcc3">
+    <dgm:scene3d>
+      <a:camera prst="orthographicFront"/>
+      <a:lightRig rig="threePt" dir="t"/>
+    </dgm:scene3d>
+    <dgm:sp3d/>
+    <dgm:txPr/>
+    <dgm:style>
+      <a:lnRef idx="2">
+        <a:scrgbClr r="0" g="0" b="0"/>
+      </a:lnRef>
+      <a:fillRef idx="1">
+        <a:scrgbClr r="0" g="0" b="0"/>
+      </a:fillRef>
+      <a:effectRef idx="0">
+        <a:scrgbClr r="0" g="0" b="0"/>
+      </a:effectRef>
+      <a:fontRef idx="minor"/>
+    </dgm:style>
+  </dgm:styleLbl>
+  <dgm:styleLbl name="fgAcc4">
+    <dgm:scene3d>
+      <a:camera prst="orthographicFront"/>
+      <a:lightRig rig="threePt" dir="t"/>
+    </dgm:scene3d>
+    <dgm:sp3d/>
+    <dgm:txPr/>
+    <dgm:style>
+      <a:lnRef idx="2">
+        <a:scrgbClr r="0" g="0" b="0"/>
+      </a:lnRef>
+      <a:fillRef idx="1">
+        <a:scrgbClr r="0" g="0" b="0"/>
+      </a:fillRef>
+      <a:effectRef idx="0">
+        <a:scrgbClr r="0" g="0" b="0"/>
+      </a:effectRef>
+      <a:fontRef idx="minor"/>
+    </dgm:style>
+  </dgm:styleLbl>
+  <dgm:styleLbl name="bgShp">
+    <dgm:scene3d>
+      <a:camera prst="orthographicFront"/>
+      <a:lightRig rig="threePt" dir="t"/>
+    </dgm:scene3d>
+    <dgm:sp3d/>
+    <dgm:txPr/>
+    <dgm:style>
+      <a:lnRef idx="0">
+        <a:scrgbClr r="0" g="0" b="0"/>
+      </a:lnRef>
+      <a:fillRef idx="1">
+        <a:scrgbClr r="0" g="0" b="0"/>
+      </a:fillRef>
+      <a:effectRef idx="0">
+        <a:scrgbClr r="0" g="0" b="0"/>
+      </a:effectRef>
+      <a:fontRef idx="minor"/>
+    </dgm:style>
+  </dgm:styleLbl>
+  <dgm:styleLbl name="dkBgShp">
+    <dgm:scene3d>
+      <a:camera prst="orthographicFront"/>
+      <a:lightRig rig="threePt" dir="t"/>
+    </dgm:scene3d>
+    <dgm:sp3d/>
+    <dgm:txPr/>
+    <dgm:style>
+      <a:lnRef idx="0">
+        <a:scrgbClr r="0" g="0" b="0"/>
+      </a:lnRef>
+      <a:fillRef idx="1">
+        <a:scrgbClr r="0" g="0" b="0"/>
+      </a:fillRef>
+      <a:effectRef idx="0">
+        <a:scrgbClr r="0" g="0" b="0"/>
+      </a:effectRef>
+      <a:fontRef idx="minor"/>
+    </dgm:style>
+  </dgm:styleLbl>
+  <dgm:styleLbl name="trBgShp">
+    <dgm:scene3d>
+      <a:camera prst="orthographicFront"/>
+      <a:lightRig rig="threePt" dir="t"/>
+    </dgm:scene3d>
+    <dgm:sp3d/>
+    <dgm:txPr/>
+    <dgm:style>
+      <a:lnRef idx="0">
+        <a:scrgbClr r="0" g="0" b="0"/>
+      </a:lnRef>
+      <a:fillRef idx="1">
+        <a:scrgbClr r="0" g="0" b="0"/>
+      </a:fillRef>
+      <a:effectRef idx="0">
+        <a:scrgbClr r="0" g="0" b="0"/>
+      </a:effectRef>
+      <a:fontRef idx="minor"/>
+    </dgm:style>
+  </dgm:styleLbl>
+  <dgm:styleLbl name="fgShp">
+    <dgm:scene3d>
+      <a:camera prst="orthographicFront"/>
+      <a:lightRig rig="threePt" dir="t"/>
+    </dgm:scene3d>
+    <dgm:sp3d/>
+    <dgm:txPr/>
+    <dgm:style>
+      <a:lnRef idx="2">
+        <a:scrgbClr r="0" g="0" b="0"/>
+      </a:lnRef>
+      <a:fillRef idx="1">
+        <a:scrgbClr r="0" g="0" b="0"/>
+      </a:fillRef>
+      <a:effectRef idx="0">
+        <a:scrgbClr r="0" g="0" b="0"/>
+      </a:effectRef>
+      <a:fontRef idx="minor"/>
+    </dgm:style>
+  </dgm:styleLbl>
+  <dgm:styleLbl name="revTx">
+    <dgm:scene3d>
+      <a:camera prst="orthographicFront"/>
+      <a:lightRig rig="threePt" dir="t"/>
+    </dgm:scene3d>
+    <dgm:sp3d/>
+    <dgm:txPr/>
+    <dgm:style>
+      <a:lnRef idx="0">
+        <a:scrgbClr r="0" g="0" b="0"/>
+      </a:lnRef>
+      <a:fillRef idx="0">
+        <a:scrgbClr r="0" g="0" b="0"/>
+      </a:fillRef>
+      <a:effectRef idx="0">
+        <a:scrgbClr r="0" g="0" b="0"/>
+      </a:effectRef>
+      <a:fontRef idx="minor"/>
+    </dgm:style>
+  </dgm:styleLbl>
+</dgm:styleDef>
+</file>
+
+<file path=ppt/diagrams/quickStyle2.xml><?xml version="1.0" encoding="utf-8"?>
 <dgm:styleDef xmlns:dgm="http://schemas.openxmlformats.org/drawingml/2006/diagram" xmlns:a="http://schemas.openxmlformats.org/drawingml/2006/main" uniqueId="urn:microsoft.com/office/officeart/2005/8/quickstyle/simple1">
   <dgm:title val=""/>
   <dgm:desc val=""/>
@@ -6003,7 +8869,7 @@
           <a:p>
             <a:fld id="{9A529F1E-81D1-496E-9E52-EF8D5495F147}" type="datetimeFigureOut">
               <a:rPr lang="en-US" smtClean="0"/>
-              <a:t>20-Dec-22</a:t>
+              <a:t>24-Dec-22</a:t>
             </a:fld>
             <a:endParaRPr lang="en-US"/>
           </a:p>
@@ -6327,7 +9193,7 @@
           <a:p>
             <a:fld id="{9A529F1E-81D1-496E-9E52-EF8D5495F147}" type="datetimeFigureOut">
               <a:rPr lang="en-US" smtClean="0"/>
-              <a:t>20-Dec-22</a:t>
+              <a:t>24-Dec-22</a:t>
             </a:fld>
             <a:endParaRPr lang="en-US"/>
           </a:p>
@@ -6575,7 +9441,7 @@
           <a:p>
             <a:fld id="{9A529F1E-81D1-496E-9E52-EF8D5495F147}" type="datetimeFigureOut">
               <a:rPr lang="en-US" smtClean="0"/>
-              <a:t>20-Dec-22</a:t>
+              <a:t>24-Dec-22</a:t>
             </a:fld>
             <a:endParaRPr lang="en-US"/>
           </a:p>
@@ -6914,7 +9780,7 @@
           <a:p>
             <a:fld id="{9A529F1E-81D1-496E-9E52-EF8D5495F147}" type="datetimeFigureOut">
               <a:rPr lang="en-US" smtClean="0"/>
-              <a:t>20-Dec-22</a:t>
+              <a:t>24-Dec-22</a:t>
             </a:fld>
             <a:endParaRPr lang="en-US"/>
           </a:p>
@@ -7261,7 +10127,7 @@
           <a:p>
             <a:fld id="{9A529F1E-81D1-496E-9E52-EF8D5495F147}" type="datetimeFigureOut">
               <a:rPr lang="en-US" smtClean="0"/>
-              <a:t>20-Dec-22</a:t>
+              <a:t>24-Dec-22</a:t>
             </a:fld>
             <a:endParaRPr lang="en-US"/>
           </a:p>
@@ -7635,7 +10501,7 @@
           <a:p>
             <a:fld id="{9A529F1E-81D1-496E-9E52-EF8D5495F147}" type="datetimeFigureOut">
               <a:rPr lang="en-US" smtClean="0"/>
-              <a:t>20-Dec-22</a:t>
+              <a:t>24-Dec-22</a:t>
             </a:fld>
             <a:endParaRPr lang="en-US"/>
           </a:p>
@@ -8105,7 +10971,7 @@
           <a:p>
             <a:fld id="{9A529F1E-81D1-496E-9E52-EF8D5495F147}" type="datetimeFigureOut">
               <a:rPr lang="en-US" smtClean="0"/>
-              <a:t>20-Dec-22</a:t>
+              <a:t>24-Dec-22</a:t>
             </a:fld>
             <a:endParaRPr lang="en-US"/>
           </a:p>
@@ -8310,7 +11176,7 @@
           <a:p>
             <a:fld id="{9A529F1E-81D1-496E-9E52-EF8D5495F147}" type="datetimeFigureOut">
               <a:rPr lang="en-US" smtClean="0"/>
-              <a:t>20-Dec-22</a:t>
+              <a:t>24-Dec-22</a:t>
             </a:fld>
             <a:endParaRPr lang="en-US"/>
           </a:p>
@@ -8521,7 +11387,7 @@
           <a:p>
             <a:fld id="{9A529F1E-81D1-496E-9E52-EF8D5495F147}" type="datetimeFigureOut">
               <a:rPr lang="en-US" smtClean="0"/>
-              <a:t>20-Dec-22</a:t>
+              <a:t>24-Dec-22</a:t>
             </a:fld>
             <a:endParaRPr lang="en-US"/>
           </a:p>
@@ -8753,7 +11619,7 @@
           <a:p>
             <a:fld id="{9A529F1E-81D1-496E-9E52-EF8D5495F147}" type="datetimeFigureOut">
               <a:rPr lang="en-US" smtClean="0"/>
-              <a:t>20-Dec-22</a:t>
+              <a:t>24-Dec-22</a:t>
             </a:fld>
             <a:endParaRPr lang="en-US"/>
           </a:p>
@@ -9001,7 +11867,7 @@
           <a:p>
             <a:fld id="{9A529F1E-81D1-496E-9E52-EF8D5495F147}" type="datetimeFigureOut">
               <a:rPr lang="en-US" smtClean="0"/>
-              <a:t>20-Dec-22</a:t>
+              <a:t>24-Dec-22</a:t>
             </a:fld>
             <a:endParaRPr lang="en-US"/>
           </a:p>
@@ -9299,7 +12165,7 @@
           <a:p>
             <a:fld id="{9A529F1E-81D1-496E-9E52-EF8D5495F147}" type="datetimeFigureOut">
               <a:rPr lang="en-US" smtClean="0"/>
-              <a:t>20-Dec-22</a:t>
+              <a:t>24-Dec-22</a:t>
             </a:fld>
             <a:endParaRPr lang="en-US"/>
           </a:p>
@@ -9693,7 +12559,7 @@
           <a:p>
             <a:fld id="{9A529F1E-81D1-496E-9E52-EF8D5495F147}" type="datetimeFigureOut">
               <a:rPr lang="en-US" smtClean="0"/>
-              <a:t>20-Dec-22</a:t>
+              <a:t>24-Dec-22</a:t>
             </a:fld>
             <a:endParaRPr lang="en-US"/>
           </a:p>
@@ -9842,7 +12708,7 @@
           <a:p>
             <a:fld id="{9A529F1E-81D1-496E-9E52-EF8D5495F147}" type="datetimeFigureOut">
               <a:rPr lang="en-US" smtClean="0"/>
-              <a:t>20-Dec-22</a:t>
+              <a:t>24-Dec-22</a:t>
             </a:fld>
             <a:endParaRPr lang="en-US"/>
           </a:p>
@@ -9968,7 +12834,7 @@
           <a:p>
             <a:fld id="{9A529F1E-81D1-496E-9E52-EF8D5495F147}" type="datetimeFigureOut">
               <a:rPr lang="en-US" smtClean="0"/>
-              <a:t>20-Dec-22</a:t>
+              <a:t>24-Dec-22</a:t>
             </a:fld>
             <a:endParaRPr lang="en-US"/>
           </a:p>
@@ -10223,7 +13089,7 @@
           <a:p>
             <a:fld id="{9A529F1E-81D1-496E-9E52-EF8D5495F147}" type="datetimeFigureOut">
               <a:rPr lang="en-US" smtClean="0"/>
-              <a:t>20-Dec-22</a:t>
+              <a:t>24-Dec-22</a:t>
             </a:fld>
             <a:endParaRPr lang="en-US"/>
           </a:p>
@@ -10538,7 +13404,7 @@
           <a:p>
             <a:fld id="{9A529F1E-81D1-496E-9E52-EF8D5495F147}" type="datetimeFigureOut">
               <a:rPr lang="en-US" smtClean="0"/>
-              <a:t>20-Dec-22</a:t>
+              <a:t>24-Dec-22</a:t>
             </a:fld>
             <a:endParaRPr lang="en-US"/>
           </a:p>
@@ -10889,7 +13755,7 @@
           <a:p>
             <a:fld id="{9A529F1E-81D1-496E-9E52-EF8D5495F147}" type="datetimeFigureOut">
               <a:rPr lang="en-US" smtClean="0"/>
-              <a:t>20-Dec-22</a:t>
+              <a:t>24-Dec-22</a:t>
             </a:fld>
             <a:endParaRPr lang="en-US"/>
           </a:p>
@@ -11904,6 +14770,236 @@
 </p:sld>
 </file>
 
+<file path=ppt/slides/slide4.xml><?xml version="1.0" encoding="utf-8"?>
+<p:sld xmlns:a="http://schemas.openxmlformats.org/drawingml/2006/main" xmlns:r="http://schemas.openxmlformats.org/officeDocument/2006/relationships" xmlns:p="http://schemas.openxmlformats.org/presentationml/2006/main">
+  <p:cSld>
+    <p:spTree>
+      <p:nvGrpSpPr>
+        <p:cNvPr id="1" name=""/>
+        <p:cNvGrpSpPr/>
+        <p:nvPr/>
+      </p:nvGrpSpPr>
+      <p:grpSpPr>
+        <a:xfrm>
+          <a:off x="0" y="0"/>
+          <a:ext cx="0" cy="0"/>
+          <a:chOff x="0" y="0"/>
+          <a:chExt cx="0" cy="0"/>
+        </a:xfrm>
+      </p:grpSpPr>
+      <p:graphicFrame>
+        <p:nvGraphicFramePr>
+          <p:cNvPr id="2" name="Diagram 1">
+            <a:extLst>
+              <a:ext uri="{FF2B5EF4-FFF2-40B4-BE49-F238E27FC236}">
+                <a16:creationId xmlns:a16="http://schemas.microsoft.com/office/drawing/2014/main" id="{8CBEFDFA-A458-34E3-73B2-A510C8EB8B68}"/>
+              </a:ext>
+            </a:extLst>
+          </p:cNvPr>
+          <p:cNvGraphicFramePr/>
+          <p:nvPr>
+            <p:extLst>
+              <p:ext uri="{D42A27DB-BD31-4B8C-83A1-F6EECF244321}">
+                <p14:modId xmlns:p14="http://schemas.microsoft.com/office/powerpoint/2010/main" val="436912071"/>
+              </p:ext>
+            </p:extLst>
+          </p:nvPr>
+        </p:nvGraphicFramePr>
+        <p:xfrm>
+          <a:off x="2032000" y="719666"/>
+          <a:ext cx="8128000" cy="5418667"/>
+        </p:xfrm>
+        <a:graphic>
+          <a:graphicData uri="http://schemas.openxmlformats.org/drawingml/2006/diagram">
+            <dgm:relIds xmlns:dgm="http://schemas.openxmlformats.org/drawingml/2006/diagram" xmlns:r="http://schemas.openxmlformats.org/officeDocument/2006/relationships" r:dm="rId2" r:lo="rId3" r:qs="rId4" r:cs="rId5"/>
+          </a:graphicData>
+        </a:graphic>
+      </p:graphicFrame>
+      <p:sp>
+        <p:nvSpPr>
+          <p:cNvPr id="3" name="TextBox 2">
+            <a:extLst>
+              <a:ext uri="{FF2B5EF4-FFF2-40B4-BE49-F238E27FC236}">
+                <a16:creationId xmlns:a16="http://schemas.microsoft.com/office/drawing/2014/main" id="{777B0CBE-8FCD-B435-B820-BE3DA75EB03C}"/>
+              </a:ext>
+            </a:extLst>
+          </p:cNvPr>
+          <p:cNvSpPr txBox="1"/>
+          <p:nvPr/>
+        </p:nvSpPr>
+        <p:spPr>
+          <a:xfrm>
+            <a:off x="2032000" y="4285129"/>
+            <a:ext cx="1801904" cy="1015663"/>
+          </a:xfrm>
+          <a:prstGeom prst="rect">
+            <a:avLst/>
+          </a:prstGeom>
+          <a:noFill/>
+        </p:spPr>
+        <p:txBody>
+          <a:bodyPr wrap="square" rtlCol="0">
+            <a:spAutoFit/>
+          </a:bodyPr>
+          <a:lstStyle/>
+          <a:p>
+            <a:r>
+              <a:rPr lang="en-US" sz="1200" dirty="0"/>
+              <a:t>This is a manual operation. The focus is on the links from the </a:t>
+            </a:r>
+            <a:r>
+              <a:rPr lang="en-US" sz="1200" dirty="0" err="1"/>
+              <a:t>SyRSs</a:t>
+            </a:r>
+            <a:r>
+              <a:rPr lang="en-US" sz="1200" dirty="0"/>
+              <a:t> to the URSs because the URSs have almost no links.</a:t>
+            </a:r>
+          </a:p>
+        </p:txBody>
+      </p:sp>
+      <p:sp>
+        <p:nvSpPr>
+          <p:cNvPr id="6" name="TextBox 5">
+            <a:extLst>
+              <a:ext uri="{FF2B5EF4-FFF2-40B4-BE49-F238E27FC236}">
+                <a16:creationId xmlns:a16="http://schemas.microsoft.com/office/drawing/2014/main" id="{5F08C168-0189-620E-2B87-08B9F8EB7262}"/>
+              </a:ext>
+            </a:extLst>
+          </p:cNvPr>
+          <p:cNvSpPr txBox="1"/>
+          <p:nvPr/>
+        </p:nvSpPr>
+        <p:spPr>
+          <a:xfrm>
+            <a:off x="4192494" y="4285129"/>
+            <a:ext cx="1634565" cy="1384995"/>
+          </a:xfrm>
+          <a:prstGeom prst="rect">
+            <a:avLst/>
+          </a:prstGeom>
+          <a:noFill/>
+        </p:spPr>
+        <p:txBody>
+          <a:bodyPr wrap="square" rtlCol="0">
+            <a:spAutoFit/>
+          </a:bodyPr>
+          <a:lstStyle/>
+          <a:p>
+            <a:r>
+              <a:rPr lang="en-US" sz="1200" dirty="0"/>
+              <a:t>Tracer creates a consolidated list of all the links in the </a:t>
+            </a:r>
+            <a:r>
+              <a:rPr lang="en-US" sz="1200" dirty="0" err="1"/>
+              <a:t>SyRSs</a:t>
+            </a:r>
+            <a:r>
+              <a:rPr lang="en-US" sz="1200" dirty="0"/>
+              <a:t> to the URSs. It also creates a list of missing links. These links need to be patched in.</a:t>
+            </a:r>
+          </a:p>
+        </p:txBody>
+      </p:sp>
+      <p:sp>
+        <p:nvSpPr>
+          <p:cNvPr id="7" name="TextBox 6">
+            <a:extLst>
+              <a:ext uri="{FF2B5EF4-FFF2-40B4-BE49-F238E27FC236}">
+                <a16:creationId xmlns:a16="http://schemas.microsoft.com/office/drawing/2014/main" id="{3E3E8956-A91B-87A9-3395-17B05D23219B}"/>
+              </a:ext>
+            </a:extLst>
+          </p:cNvPr>
+          <p:cNvSpPr txBox="1"/>
+          <p:nvPr/>
+        </p:nvSpPr>
+        <p:spPr>
+          <a:xfrm>
+            <a:off x="6358964" y="4285128"/>
+            <a:ext cx="1634565" cy="1015663"/>
+          </a:xfrm>
+          <a:prstGeom prst="rect">
+            <a:avLst/>
+          </a:prstGeom>
+          <a:noFill/>
+        </p:spPr>
+        <p:txBody>
+          <a:bodyPr wrap="square" rtlCol="0">
+            <a:spAutoFit/>
+          </a:bodyPr>
+          <a:lstStyle/>
+          <a:p>
+            <a:r>
+              <a:rPr lang="en-US" sz="1200" dirty="0"/>
+              <a:t>Generates a concordance of URSs mapped to </a:t>
+            </a:r>
+            <a:r>
+              <a:rPr lang="en-US" sz="1200" dirty="0" err="1"/>
+              <a:t>SyRSs</a:t>
+            </a:r>
+            <a:r>
+              <a:rPr lang="en-US" sz="1200" dirty="0"/>
+              <a:t> and merges in any patched links.</a:t>
+            </a:r>
+          </a:p>
+        </p:txBody>
+      </p:sp>
+      <p:sp>
+        <p:nvSpPr>
+          <p:cNvPr id="8" name="TextBox 7">
+            <a:extLst>
+              <a:ext uri="{FF2B5EF4-FFF2-40B4-BE49-F238E27FC236}">
+                <a16:creationId xmlns:a16="http://schemas.microsoft.com/office/drawing/2014/main" id="{A29CBD52-634E-9975-A1BD-32E461462B67}"/>
+              </a:ext>
+            </a:extLst>
+          </p:cNvPr>
+          <p:cNvSpPr txBox="1"/>
+          <p:nvPr/>
+        </p:nvSpPr>
+        <p:spPr>
+          <a:xfrm>
+            <a:off x="8525435" y="4204447"/>
+            <a:ext cx="1634565" cy="1200329"/>
+          </a:xfrm>
+          <a:prstGeom prst="rect">
+            <a:avLst/>
+          </a:prstGeom>
+          <a:noFill/>
+        </p:spPr>
+        <p:txBody>
+          <a:bodyPr wrap="square" rtlCol="0">
+            <a:spAutoFit/>
+          </a:bodyPr>
+          <a:lstStyle/>
+          <a:p>
+            <a:r>
+              <a:rPr lang="en-US" sz="1200" dirty="0"/>
+              <a:t>Augments the </a:t>
+            </a:r>
+            <a:r>
+              <a:rPr lang="en-US" sz="1200" dirty="0" err="1"/>
+              <a:t>URS→SyRS</a:t>
+            </a:r>
+            <a:r>
+              <a:rPr lang="en-US" sz="1200" dirty="0"/>
+              <a:t> mapping with Test Cases and Test Runs. This completes the processing.</a:t>
+            </a:r>
+          </a:p>
+        </p:txBody>
+      </p:sp>
+    </p:spTree>
+    <p:extLst>
+      <p:ext uri="{BB962C8B-B14F-4D97-AF65-F5344CB8AC3E}">
+        <p14:creationId xmlns:p14="http://schemas.microsoft.com/office/powerpoint/2010/main" val="1142955512"/>
+      </p:ext>
+    </p:extLst>
+  </p:cSld>
+  <p:clrMapOvr>
+    <a:masterClrMapping/>
+  </p:clrMapOvr>
+</p:sld>
+</file>
+
 <file path=ppt/theme/theme1.xml><?xml version="1.0" encoding="utf-8"?>
 <a:theme xmlns:a="http://schemas.openxmlformats.org/drawingml/2006/main" name="Organic">
   <a:themeElements>

</xml_diff>